<commit_message>
Update Day 3 slides
</commit_message>
<xml_diff>
--- a/Day 3-4.pptx
+++ b/Day 3-4.pptx
@@ -7008,8 +7008,8 @@
           <a:lstStyle/>
           <a:p>
             <a:r>
-              <a:rPr lang="en-CA" dirty="0"/>
-              <a:t>When Your Data Outgrows Your Laptop</a:t>
+              <a:rPr lang="en-CA"/>
+              <a:t>AI Is </a:t>
             </a:r>
             <a:endParaRPr lang="en-US" dirty="0"/>
           </a:p>

</xml_diff>

<commit_message>
Update all slide decks
</commit_message>
<xml_diff>
--- a/Day 3-4.pptx
+++ b/Day 3-4.pptx
@@ -5,16 +5,21 @@
     <p:sldMasterId id="2147483673" r:id="rId4"/>
   </p:sldMasterIdLst>
   <p:notesMasterIdLst>
-    <p:notesMasterId r:id="rId9"/>
+    <p:notesMasterId r:id="rId14"/>
   </p:notesMasterIdLst>
   <p:handoutMasterIdLst>
-    <p:handoutMasterId r:id="rId10"/>
+    <p:handoutMasterId r:id="rId15"/>
   </p:handoutMasterIdLst>
   <p:sldIdLst>
     <p:sldId id="257" r:id="rId5"/>
     <p:sldId id="264" r:id="rId6"/>
     <p:sldId id="262" r:id="rId7"/>
     <p:sldId id="270" r:id="rId8"/>
+    <p:sldId id="271" r:id="rId9"/>
+    <p:sldId id="489" r:id="rId10"/>
+    <p:sldId id="486" r:id="rId11"/>
+    <p:sldId id="487" r:id="rId12"/>
+    <p:sldId id="488" r:id="rId13"/>
   </p:sldIdLst>
   <p:sldSz cx="12192000" cy="6858000"/>
   <p:notesSz cx="6858000" cy="9144000"/>
@@ -215,7 +220,7 @@
           <a:p>
             <a:fld id="{2FE516B2-C096-46B8-BF82-53365F257CA4}" type="datetimeFigureOut">
               <a:rPr lang="en-CA" smtClean="0"/>
-              <a:t>2023-01-20</a:t>
+              <a:t>2023-03-16</a:t>
             </a:fld>
             <a:endParaRPr lang="en-CA"/>
           </a:p>
@@ -393,7 +398,7 @@
           <a:p>
             <a:fld id="{98592766-6D16-4BDE-A3D4-3C8E7677E7B5}" type="datetimeFigureOut">
               <a:rPr lang="en-CA" smtClean="0"/>
-              <a:t>2023-01-20</a:t>
+              <a:t>2023-03-16</a:t>
             </a:fld>
             <a:endParaRPr lang="en-CA"/>
           </a:p>
@@ -1241,7 +1246,7 @@
           <a:p>
             <a:fld id="{EA0C0817-A112-4847-8014-A94B7D2A4EA3}" type="datetime1">
               <a:rPr lang="en-US" smtClean="0"/>
-              <a:t>1/20/23</a:t>
+              <a:t>3/16/2023</a:t>
             </a:fld>
             <a:endParaRPr lang="en-US"/>
           </a:p>
@@ -1441,7 +1446,7 @@
           <a:p>
             <a:fld id="{7332B432-ACDA-4023-A761-2BAB76577B62}" type="datetime1">
               <a:rPr lang="en-US" smtClean="0"/>
-              <a:t>1/20/23</a:t>
+              <a:t>3/16/2023</a:t>
             </a:fld>
             <a:endParaRPr lang="en-US"/>
           </a:p>
@@ -2039,7 +2044,7 @@
           <a:p>
             <a:fld id="{D9C646AA-F36E-4540-911D-FFFC0A0EF24A}" type="datetime1">
               <a:rPr lang="en-US" smtClean="0"/>
-              <a:t>1/20/23</a:t>
+              <a:t>3/16/2023</a:t>
             </a:fld>
             <a:endParaRPr lang="en-US"/>
           </a:p>
@@ -2356,7 +2361,7 @@
           <a:p>
             <a:fld id="{69186D26-FA5F-4637-B602-B7C2DC34CFD4}" type="datetime1">
               <a:rPr lang="en-US" smtClean="0"/>
-              <a:t>1/20/23</a:t>
+              <a:t>3/16/2023</a:t>
             </a:fld>
             <a:endParaRPr lang="en-US"/>
           </a:p>
@@ -2790,7 +2795,7 @@
           <a:p>
             <a:fld id="{8A7F15D8-96D1-4781-BC50-CA8A088B2FE4}" type="datetime1">
               <a:rPr lang="en-US" smtClean="0"/>
-              <a:t>1/20/23</a:t>
+              <a:t>3/16/2023</a:t>
             </a:fld>
             <a:endParaRPr lang="en-US"/>
           </a:p>
@@ -2907,7 +2912,7 @@
           <a:p>
             <a:fld id="{F9A96C99-B8F8-4528-BD05-0E16E943DC09}" type="datetime1">
               <a:rPr lang="en-US" smtClean="0"/>
-              <a:t>1/20/23</a:t>
+              <a:t>3/16/2023</a:t>
             </a:fld>
             <a:endParaRPr lang="en-US"/>
           </a:p>
@@ -3002,7 +3007,7 @@
           <a:p>
             <a:fld id="{03636942-C211-4B28-8DBD-C953E00AF71B}" type="datetime1">
               <a:rPr lang="en-US" smtClean="0"/>
-              <a:t>1/20/23</a:t>
+              <a:t>3/16/2023</a:t>
             </a:fld>
             <a:endParaRPr lang="en-US"/>
           </a:p>
@@ -3417,7 +3422,7 @@
           <a:p>
             <a:fld id="{7E8D12A6-918A-48BD-8CB9-CA713993B0EA}" type="datetime1">
               <a:rPr lang="en-US" smtClean="0"/>
-              <a:t>1/20/23</a:t>
+              <a:t>3/16/2023</a:t>
             </a:fld>
             <a:endParaRPr lang="en-US"/>
           </a:p>
@@ -3678,7 +3683,7 @@
             <a:fld id="{E778CE86-875F-4587-BCF6-FA054AFC0D53}" type="datetime1">
               <a:rPr lang="en-US" smtClean="0"/>
               <a:pPr/>
-              <a:t>1/20/23</a:t>
+              <a:t>3/16/2023</a:t>
             </a:fld>
             <a:endParaRPr lang="en-US"/>
           </a:p>
@@ -4191,7 +4196,7 @@
           <a:p>
             <a:fld id="{F6FA2B21-3FCD-4721-B95C-427943F61125}" type="datetime1">
               <a:rPr lang="en-US" smtClean="0"/>
-              <a:t>1/20/23</a:t>
+              <a:t>3/16/2023</a:t>
             </a:fld>
             <a:endParaRPr lang="en-US"/>
           </a:p>
@@ -4824,7 +4829,7 @@
                   <a:schemeClr val="tx1"/>
                 </a:solidFill>
               </a:rPr>
-              <a:t>Cloud Computing</a:t>
+              <a:t>MLOps</a:t>
             </a:r>
           </a:p>
         </p:txBody>
@@ -6637,9 +6642,10 @@
               <a:t>VertexAI</a:t>
             </a:r>
             <a:r>
-              <a:rPr lang="en-US" dirty="0"/>
-              <a:t>, Kubeflow pipelines</a:t>
-            </a:r>
+              <a:rPr lang="en-US"/>
+              <a:t>, AutoML</a:t>
+            </a:r>
+            <a:endParaRPr lang="en-US" dirty="0"/>
           </a:p>
         </p:txBody>
       </p:sp>
@@ -6905,8 +6911,22 @@
               <a:buChar char="•"/>
             </a:pPr>
             <a:r>
+              <a:rPr lang="en-US"/>
+              <a:t>Kubeflow Pipelines</a:t>
+            </a:r>
+          </a:p>
+          <a:p>
+            <a:pPr marL="285750" indent="-285750">
+              <a:buFont typeface="Arial" panose="020B0604020202020204" pitchFamily="34" charset="0"/>
+              <a:buChar char="•"/>
+            </a:pPr>
+            <a:r>
+              <a:rPr lang="en-US"/>
+              <a:t>Some </a:t>
+            </a:r>
+            <a:r>
               <a:rPr lang="en-US" dirty="0"/>
-              <a:t>Some case studies of big data architectures</a:t>
+              <a:t>case studies of big data architectures</a:t>
             </a:r>
           </a:p>
           <a:p>
@@ -7009,7 +7029,7 @@
           <a:p>
             <a:r>
               <a:rPr lang="en-CA"/>
-              <a:t>AI Is </a:t>
+              <a:t>AI Is Anything You Can’t Do In Excel </a:t>
             </a:r>
             <a:endParaRPr lang="en-US" dirty="0"/>
           </a:p>
@@ -7045,6 +7065,36 @@
           <a:chExt cx="0" cy="0"/>
         </a:xfrm>
       </p:grpSpPr>
+      <p:pic>
+        <p:nvPicPr>
+          <p:cNvPr id="11" name="Picture 10" descr="Diagram&#10;&#10;Description automatically generated">
+            <a:extLst>
+              <a:ext uri="{FF2B5EF4-FFF2-40B4-BE49-F238E27FC236}">
+                <a16:creationId xmlns:a16="http://schemas.microsoft.com/office/drawing/2014/main" id="{2F2148E5-FA60-9211-78C1-F43F82D963C8}"/>
+              </a:ext>
+            </a:extLst>
+          </p:cNvPr>
+          <p:cNvPicPr>
+            <a:picLocks noChangeAspect="1"/>
+          </p:cNvPicPr>
+          <p:nvPr/>
+        </p:nvPicPr>
+        <p:blipFill>
+          <a:blip r:embed="rId2"/>
+          <a:stretch>
+            <a:fillRect/>
+          </a:stretch>
+        </p:blipFill>
+        <p:spPr>
+          <a:xfrm>
+            <a:off x="77909" y="603504"/>
+            <a:ext cx="8771124" cy="5389123"/>
+          </a:xfrm>
+          <a:prstGeom prst="rect">
+            <a:avLst/>
+          </a:prstGeom>
+        </p:spPr>
+      </p:pic>
       <p:sp>
         <p:nvSpPr>
           <p:cNvPr id="9" name="Title 8">
@@ -7061,33 +7111,806 @@
             <p:ph type="title"/>
           </p:nvPr>
         </p:nvSpPr>
-        <p:spPr/>
+        <p:spPr>
+          <a:xfrm>
+            <a:off x="8477250" y="603504"/>
+            <a:ext cx="3144774" cy="524905"/>
+          </a:xfrm>
+        </p:spPr>
         <p:txBody>
           <a:bodyPr/>
           <a:lstStyle/>
           <a:p>
             <a:r>
-              <a:rPr lang="en-US" dirty="0"/>
-              <a:t>Horizontal and Vertical Scaling</a:t>
-            </a:r>
+              <a:rPr lang="en-US"/>
+              <a:t>AI vs ML</a:t>
+            </a:r>
+            <a:endParaRPr lang="en-US" dirty="0"/>
+          </a:p>
+        </p:txBody>
+      </p:sp>
+      <p:sp>
+        <p:nvSpPr>
+          <p:cNvPr id="12" name="TextBox 11">
+            <a:extLst>
+              <a:ext uri="{FF2B5EF4-FFF2-40B4-BE49-F238E27FC236}">
+                <a16:creationId xmlns:a16="http://schemas.microsoft.com/office/drawing/2014/main" id="{3507AAD7-6C14-7076-9044-4801CCD4C7EF}"/>
+              </a:ext>
+            </a:extLst>
+          </p:cNvPr>
+          <p:cNvSpPr txBox="1"/>
+          <p:nvPr/>
+        </p:nvSpPr>
+        <p:spPr>
+          <a:xfrm>
+            <a:off x="8562975" y="1495425"/>
+            <a:ext cx="3144774" cy="3970318"/>
+          </a:xfrm>
+          <a:prstGeom prst="rect">
+            <a:avLst/>
+          </a:prstGeom>
+          <a:noFill/>
+        </p:spPr>
+        <p:txBody>
+          <a:bodyPr wrap="square" rtlCol="0">
+            <a:spAutoFit/>
+          </a:bodyPr>
+          <a:lstStyle/>
+          <a:p>
+            <a:r>
+              <a:rPr lang="en-US"/>
+              <a:t>Although often used interchangeably, Machine Learning is a particular subset of Artificial Intelligence; specifically the one that benefits from large volumes of labeled or unlabeled data.</a:t>
+            </a:r>
+          </a:p>
+          <a:p>
+            <a:endParaRPr lang="en-US"/>
+          </a:p>
+          <a:p>
+            <a:r>
+              <a:rPr lang="en-US"/>
+              <a:t>Most of the excitement around AI these days is being generated by the even more specific subset of Deep Learning.</a:t>
+            </a:r>
+            <a:endParaRPr lang="en-CA"/>
+          </a:p>
+        </p:txBody>
+      </p:sp>
+    </p:spTree>
+    <p:extLst>
+      <p:ext uri="{BB962C8B-B14F-4D97-AF65-F5344CB8AC3E}">
+        <p14:creationId xmlns:p14="http://schemas.microsoft.com/office/powerpoint/2010/main" val="3939276664"/>
+      </p:ext>
+    </p:extLst>
+  </p:cSld>
+  <p:clrMapOvr>
+    <a:masterClrMapping/>
+  </p:clrMapOvr>
+</p:sld>
+</file>
+
+<file path=ppt/slides/slide5.xml><?xml version="1.0" encoding="utf-8"?>
+<p:sld xmlns:a="http://schemas.openxmlformats.org/drawingml/2006/main" xmlns:r="http://schemas.openxmlformats.org/officeDocument/2006/relationships" xmlns:p="http://schemas.openxmlformats.org/presentationml/2006/main">
+  <p:cSld>
+    <p:spTree>
+      <p:nvGrpSpPr>
+        <p:cNvPr id="1" name=""/>
+        <p:cNvGrpSpPr/>
+        <p:nvPr/>
+      </p:nvGrpSpPr>
+      <p:grpSpPr>
+        <a:xfrm>
+          <a:off x="0" y="0"/>
+          <a:ext cx="0" cy="0"/>
+          <a:chOff x="0" y="0"/>
+          <a:chExt cx="0" cy="0"/>
+        </a:xfrm>
+      </p:grpSpPr>
+      <p:sp>
+        <p:nvSpPr>
+          <p:cNvPr id="15" name="Arrow: Circular 14">
+            <a:extLst>
+              <a:ext uri="{FF2B5EF4-FFF2-40B4-BE49-F238E27FC236}">
+                <a16:creationId xmlns:a16="http://schemas.microsoft.com/office/drawing/2014/main" id="{45DEA589-C81D-703A-B683-859BE2C8AEAC}"/>
+              </a:ext>
+            </a:extLst>
+          </p:cNvPr>
+          <p:cNvSpPr/>
+          <p:nvPr/>
+        </p:nvSpPr>
+        <p:spPr>
+          <a:xfrm>
+            <a:off x="340468" y="1506330"/>
+            <a:ext cx="7684851" cy="4310809"/>
+          </a:xfrm>
+          <a:prstGeom prst="circularArrow">
+            <a:avLst>
+              <a:gd name="adj1" fmla="val 6445"/>
+              <a:gd name="adj2" fmla="val 704844"/>
+              <a:gd name="adj3" fmla="val 20095681"/>
+              <a:gd name="adj4" fmla="val 814020"/>
+              <a:gd name="adj5" fmla="val 10269"/>
+            </a:avLst>
+          </a:prstGeom>
+          <a:solidFill>
+            <a:schemeClr val="accent2">
+              <a:lumMod val="40000"/>
+              <a:lumOff val="60000"/>
+            </a:schemeClr>
+          </a:solidFill>
+          <a:ln>
+            <a:solidFill>
+              <a:schemeClr val="accent2">
+                <a:lumMod val="75000"/>
+              </a:schemeClr>
+            </a:solidFill>
+          </a:ln>
+          <a:effectLst>
+            <a:outerShdw blurRad="50800" dist="38100" dir="5400000" algn="t" rotWithShape="0">
+              <a:prstClr val="black">
+                <a:alpha val="40000"/>
+              </a:prstClr>
+            </a:outerShdw>
+          </a:effectLst>
+        </p:spPr>
+        <p:style>
+          <a:lnRef idx="2">
+            <a:schemeClr val="accent1">
+              <a:shade val="50000"/>
+            </a:schemeClr>
+          </a:lnRef>
+          <a:fillRef idx="1">
+            <a:schemeClr val="accent1"/>
+          </a:fillRef>
+          <a:effectRef idx="0">
+            <a:schemeClr val="accent1"/>
+          </a:effectRef>
+          <a:fontRef idx="minor">
+            <a:schemeClr val="lt1"/>
+          </a:fontRef>
+        </p:style>
+        <p:txBody>
+          <a:bodyPr rtlCol="0" anchor="t"/>
+          <a:lstStyle/>
+          <a:p>
+            <a:pPr algn="ctr"/>
+            <a:endParaRPr lang="en-CA">
+              <a:solidFill>
+                <a:schemeClr val="tx1"/>
+              </a:solidFill>
+            </a:endParaRPr>
+          </a:p>
+        </p:txBody>
+      </p:sp>
+      <p:sp>
+        <p:nvSpPr>
+          <p:cNvPr id="9" name="Title 8">
+            <a:extLst>
+              <a:ext uri="{FF2B5EF4-FFF2-40B4-BE49-F238E27FC236}">
+                <a16:creationId xmlns:a16="http://schemas.microsoft.com/office/drawing/2014/main" id="{6B6ECF17-AC73-A854-6E16-98A083AFB5CB}"/>
+              </a:ext>
+            </a:extLst>
+          </p:cNvPr>
+          <p:cNvSpPr>
+            <a:spLocks noGrp="1"/>
+          </p:cNvSpPr>
+          <p:nvPr>
+            <p:ph type="title"/>
+          </p:nvPr>
+        </p:nvSpPr>
+        <p:spPr>
+          <a:xfrm>
+            <a:off x="8477250" y="603504"/>
+            <a:ext cx="3144774" cy="524905"/>
+          </a:xfrm>
+        </p:spPr>
+        <p:txBody>
+          <a:bodyPr/>
+          <a:lstStyle/>
+          <a:p>
+            <a:r>
+              <a:rPr lang="en-US" sz="2400"/>
+              <a:t>Machine Learning Lifecycle</a:t>
+            </a:r>
+            <a:endParaRPr lang="en-US" sz="2400" dirty="0"/>
+          </a:p>
+        </p:txBody>
+      </p:sp>
+      <p:sp>
+        <p:nvSpPr>
+          <p:cNvPr id="12" name="TextBox 11">
+            <a:extLst>
+              <a:ext uri="{FF2B5EF4-FFF2-40B4-BE49-F238E27FC236}">
+                <a16:creationId xmlns:a16="http://schemas.microsoft.com/office/drawing/2014/main" id="{3507AAD7-6C14-7076-9044-4801CCD4C7EF}"/>
+              </a:ext>
+            </a:extLst>
+          </p:cNvPr>
+          <p:cNvSpPr txBox="1"/>
+          <p:nvPr/>
+        </p:nvSpPr>
+        <p:spPr>
+          <a:xfrm>
+            <a:off x="8477250" y="1495425"/>
+            <a:ext cx="3230499" cy="4801314"/>
+          </a:xfrm>
+          <a:prstGeom prst="rect">
+            <a:avLst/>
+          </a:prstGeom>
+          <a:noFill/>
+        </p:spPr>
+        <p:txBody>
+          <a:bodyPr wrap="square" rtlCol="0">
+            <a:spAutoFit/>
+          </a:bodyPr>
+          <a:lstStyle/>
+          <a:p>
+            <a:r>
+              <a:rPr lang="en-US"/>
+              <a:t>Unlike traditional software systems that operate deterministically according to requirements and algorithms that are determined at development time, ML systems learn at runtime from data, and their behaviour is inherently unstable and unpredictable.</a:t>
+            </a:r>
+          </a:p>
+          <a:p>
+            <a:endParaRPr lang="en-US"/>
+          </a:p>
+          <a:p>
+            <a:r>
+              <a:rPr lang="en-US"/>
+              <a:t>Care must be taken at every step of the lifecycle to ensure data is clean, models are accurate, etc.</a:t>
+            </a:r>
+            <a:endParaRPr lang="en-CA"/>
+          </a:p>
+        </p:txBody>
+      </p:sp>
+      <p:sp>
+        <p:nvSpPr>
+          <p:cNvPr id="2" name="Cylinder 1">
+            <a:extLst>
+              <a:ext uri="{FF2B5EF4-FFF2-40B4-BE49-F238E27FC236}">
+                <a16:creationId xmlns:a16="http://schemas.microsoft.com/office/drawing/2014/main" id="{F455A415-0CD8-24E6-0441-2622E914FAB2}"/>
+              </a:ext>
+            </a:extLst>
+          </p:cNvPr>
+          <p:cNvSpPr/>
+          <p:nvPr/>
+        </p:nvSpPr>
+        <p:spPr>
+          <a:xfrm>
+            <a:off x="6776127" y="3306235"/>
+            <a:ext cx="976364" cy="1198841"/>
+          </a:xfrm>
+          <a:prstGeom prst="can">
+            <a:avLst/>
+          </a:prstGeom>
+          <a:effectLst>
+            <a:outerShdw blurRad="50800" dist="38100" dir="2700000" algn="tl" rotWithShape="0">
+              <a:prstClr val="black">
+                <a:alpha val="40000"/>
+              </a:prstClr>
+            </a:outerShdw>
+          </a:effectLst>
+        </p:spPr>
+        <p:style>
+          <a:lnRef idx="2">
+            <a:schemeClr val="accent1">
+              <a:shade val="50000"/>
+            </a:schemeClr>
+          </a:lnRef>
+          <a:fillRef idx="1">
+            <a:schemeClr val="accent1"/>
+          </a:fillRef>
+          <a:effectRef idx="0">
+            <a:schemeClr val="accent1"/>
+          </a:effectRef>
+          <a:fontRef idx="minor">
+            <a:schemeClr val="lt1"/>
+          </a:fontRef>
+        </p:style>
+        <p:txBody>
+          <a:bodyPr rtlCol="0" anchor="ctr"/>
+          <a:lstStyle/>
+          <a:p>
+            <a:pPr algn="ctr"/>
+            <a:r>
+              <a:rPr lang="en-US" sz="1400"/>
+              <a:t>Datasets</a:t>
+            </a:r>
+            <a:endParaRPr lang="en-CA" sz="1400"/>
+          </a:p>
+        </p:txBody>
+      </p:sp>
+      <p:sp>
+        <p:nvSpPr>
+          <p:cNvPr id="5" name="Rectangle 4">
+            <a:extLst>
+              <a:ext uri="{FF2B5EF4-FFF2-40B4-BE49-F238E27FC236}">
+                <a16:creationId xmlns:a16="http://schemas.microsoft.com/office/drawing/2014/main" id="{FE93CC93-9D00-29FC-167D-B05AAEB53DEF}"/>
+              </a:ext>
+            </a:extLst>
+          </p:cNvPr>
+          <p:cNvSpPr/>
+          <p:nvPr/>
+        </p:nvSpPr>
+        <p:spPr>
+          <a:xfrm>
+            <a:off x="3404275" y="4949105"/>
+            <a:ext cx="1557236" cy="1198841"/>
+          </a:xfrm>
+          <a:prstGeom prst="rect">
+            <a:avLst/>
+          </a:prstGeom>
+          <a:effectLst>
+            <a:outerShdw blurRad="50800" dist="38100" dir="2700000" algn="tl" rotWithShape="0">
+              <a:prstClr val="black">
+                <a:alpha val="40000"/>
+              </a:prstClr>
+            </a:outerShdw>
+          </a:effectLst>
+        </p:spPr>
+        <p:style>
+          <a:lnRef idx="2">
+            <a:schemeClr val="accent1">
+              <a:shade val="50000"/>
+            </a:schemeClr>
+          </a:lnRef>
+          <a:fillRef idx="1">
+            <a:schemeClr val="accent1"/>
+          </a:fillRef>
+          <a:effectRef idx="0">
+            <a:schemeClr val="accent1"/>
+          </a:effectRef>
+          <a:fontRef idx="minor">
+            <a:schemeClr val="lt1"/>
+          </a:fontRef>
+        </p:style>
+        <p:txBody>
+          <a:bodyPr rtlCol="0" anchor="ctr"/>
+          <a:lstStyle/>
+          <a:p>
+            <a:pPr algn="ctr"/>
+            <a:r>
+              <a:rPr lang="en-US"/>
+              <a:t>Feature Bundle</a:t>
+            </a:r>
+            <a:endParaRPr lang="en-CA"/>
+          </a:p>
+        </p:txBody>
+      </p:sp>
+      <p:sp>
+        <p:nvSpPr>
+          <p:cNvPr id="16" name="Rectangle 15">
+            <a:extLst>
+              <a:ext uri="{FF2B5EF4-FFF2-40B4-BE49-F238E27FC236}">
+                <a16:creationId xmlns:a16="http://schemas.microsoft.com/office/drawing/2014/main" id="{ECFBE384-A672-E2E4-81C4-9B276A443C17}"/>
+              </a:ext>
+            </a:extLst>
+          </p:cNvPr>
+          <p:cNvSpPr/>
+          <p:nvPr/>
+        </p:nvSpPr>
+        <p:spPr>
+          <a:xfrm>
+            <a:off x="340468" y="2881163"/>
+            <a:ext cx="1557236" cy="1198841"/>
+          </a:xfrm>
+          <a:prstGeom prst="rect">
+            <a:avLst/>
+          </a:prstGeom>
+          <a:effectLst>
+            <a:outerShdw blurRad="50800" dist="38100" dir="2700000" algn="tl" rotWithShape="0">
+              <a:prstClr val="black">
+                <a:alpha val="40000"/>
+              </a:prstClr>
+            </a:outerShdw>
+          </a:effectLst>
+        </p:spPr>
+        <p:style>
+          <a:lnRef idx="2">
+            <a:schemeClr val="accent1">
+              <a:shade val="50000"/>
+            </a:schemeClr>
+          </a:lnRef>
+          <a:fillRef idx="1">
+            <a:schemeClr val="accent1"/>
+          </a:fillRef>
+          <a:effectRef idx="0">
+            <a:schemeClr val="accent1"/>
+          </a:effectRef>
+          <a:fontRef idx="minor">
+            <a:schemeClr val="lt1"/>
+          </a:fontRef>
+        </p:style>
+        <p:txBody>
+          <a:bodyPr rtlCol="0" anchor="ctr"/>
+          <a:lstStyle/>
+          <a:p>
+            <a:pPr algn="ctr"/>
+            <a:r>
+              <a:rPr lang="en-US"/>
+              <a:t>Model</a:t>
+            </a:r>
+            <a:endParaRPr lang="en-CA"/>
+          </a:p>
+        </p:txBody>
+      </p:sp>
+      <p:sp>
+        <p:nvSpPr>
+          <p:cNvPr id="17" name="Rectangle 16">
+            <a:extLst>
+              <a:ext uri="{FF2B5EF4-FFF2-40B4-BE49-F238E27FC236}">
+                <a16:creationId xmlns:a16="http://schemas.microsoft.com/office/drawing/2014/main" id="{9DB19316-7DB5-7710-2EF9-F2BAA5FFA223}"/>
+              </a:ext>
+            </a:extLst>
+          </p:cNvPr>
+          <p:cNvSpPr/>
+          <p:nvPr/>
+        </p:nvSpPr>
+        <p:spPr>
+          <a:xfrm>
+            <a:off x="3306999" y="651686"/>
+            <a:ext cx="1557236" cy="1198841"/>
+          </a:xfrm>
+          <a:prstGeom prst="rect">
+            <a:avLst/>
+          </a:prstGeom>
+          <a:effectLst>
+            <a:outerShdw blurRad="50800" dist="38100" dir="2700000" algn="tl" rotWithShape="0">
+              <a:prstClr val="black">
+                <a:alpha val="40000"/>
+              </a:prstClr>
+            </a:outerShdw>
+          </a:effectLst>
+        </p:spPr>
+        <p:style>
+          <a:lnRef idx="2">
+            <a:schemeClr val="accent1">
+              <a:shade val="50000"/>
+            </a:schemeClr>
+          </a:lnRef>
+          <a:fillRef idx="1">
+            <a:schemeClr val="accent1"/>
+          </a:fillRef>
+          <a:effectRef idx="0">
+            <a:schemeClr val="accent1"/>
+          </a:effectRef>
+          <a:fontRef idx="minor">
+            <a:schemeClr val="lt1"/>
+          </a:fontRef>
+        </p:style>
+        <p:txBody>
+          <a:bodyPr rtlCol="0" anchor="ctr"/>
+          <a:lstStyle/>
+          <a:p>
+            <a:pPr algn="ctr"/>
+            <a:r>
+              <a:rPr lang="en-US"/>
+              <a:t>Forecasts</a:t>
+            </a:r>
+            <a:endParaRPr lang="en-CA"/>
+          </a:p>
+        </p:txBody>
+      </p:sp>
+      <p:sp>
+        <p:nvSpPr>
+          <p:cNvPr id="19" name="TextBox 18">
+            <a:extLst>
+              <a:ext uri="{FF2B5EF4-FFF2-40B4-BE49-F238E27FC236}">
+                <a16:creationId xmlns:a16="http://schemas.microsoft.com/office/drawing/2014/main" id="{653D03A6-9A32-052E-30DC-DE8EB5C71DEF}"/>
+              </a:ext>
+            </a:extLst>
+          </p:cNvPr>
+          <p:cNvSpPr txBox="1"/>
+          <p:nvPr/>
+        </p:nvSpPr>
+        <p:spPr>
+          <a:xfrm>
+            <a:off x="5777418" y="5281077"/>
+            <a:ext cx="2247900" cy="369332"/>
+          </a:xfrm>
+          <a:prstGeom prst="rect">
+            <a:avLst/>
+          </a:prstGeom>
+          <a:noFill/>
+        </p:spPr>
+        <p:txBody>
+          <a:bodyPr wrap="square" rtlCol="0">
+            <a:spAutoFit/>
+          </a:bodyPr>
+          <a:lstStyle/>
+          <a:p>
+            <a:pPr algn="r"/>
+            <a:r>
+              <a:rPr lang="en-US"/>
+              <a:t>Feature Extraction</a:t>
+            </a:r>
+            <a:endParaRPr lang="en-CA"/>
+          </a:p>
+        </p:txBody>
+      </p:sp>
+      <p:sp>
+        <p:nvSpPr>
+          <p:cNvPr id="20" name="TextBox 19">
+            <a:extLst>
+              <a:ext uri="{FF2B5EF4-FFF2-40B4-BE49-F238E27FC236}">
+                <a16:creationId xmlns:a16="http://schemas.microsoft.com/office/drawing/2014/main" id="{1AA3310C-2580-E03B-B074-B51AA6D93A83}"/>
+              </a:ext>
+            </a:extLst>
+          </p:cNvPr>
+          <p:cNvSpPr txBox="1"/>
+          <p:nvPr/>
+        </p:nvSpPr>
+        <p:spPr>
+          <a:xfrm>
+            <a:off x="212791" y="5270171"/>
+            <a:ext cx="2247900" cy="369332"/>
+          </a:xfrm>
+          <a:prstGeom prst="rect">
+            <a:avLst/>
+          </a:prstGeom>
+          <a:noFill/>
+        </p:spPr>
+        <p:txBody>
+          <a:bodyPr wrap="square" rtlCol="0">
+            <a:spAutoFit/>
+          </a:bodyPr>
+          <a:lstStyle/>
+          <a:p>
+            <a:pPr algn="ctr"/>
+            <a:r>
+              <a:rPr lang="en-US"/>
+              <a:t>Training</a:t>
+            </a:r>
+            <a:endParaRPr lang="en-CA"/>
+          </a:p>
+        </p:txBody>
+      </p:sp>
+      <p:sp>
+        <p:nvSpPr>
+          <p:cNvPr id="21" name="TextBox 20">
+            <a:extLst>
+              <a:ext uri="{FF2B5EF4-FFF2-40B4-BE49-F238E27FC236}">
+                <a16:creationId xmlns:a16="http://schemas.microsoft.com/office/drawing/2014/main" id="{2B327E6D-FB04-0B20-D2B9-D2D5C5C3B8EB}"/>
+              </a:ext>
+            </a:extLst>
+          </p:cNvPr>
+          <p:cNvSpPr txBox="1"/>
+          <p:nvPr/>
+        </p:nvSpPr>
+        <p:spPr>
+          <a:xfrm>
+            <a:off x="910345" y="1506330"/>
+            <a:ext cx="2247900" cy="369332"/>
+          </a:xfrm>
+          <a:prstGeom prst="rect">
+            <a:avLst/>
+          </a:prstGeom>
+          <a:noFill/>
+        </p:spPr>
+        <p:txBody>
+          <a:bodyPr wrap="square" rtlCol="0">
+            <a:spAutoFit/>
+          </a:bodyPr>
+          <a:lstStyle/>
+          <a:p>
+            <a:pPr algn="ctr"/>
+            <a:r>
+              <a:rPr lang="en-US"/>
+              <a:t>Inference</a:t>
+            </a:r>
+            <a:endParaRPr lang="en-CA"/>
+          </a:p>
+        </p:txBody>
+      </p:sp>
+      <p:sp>
+        <p:nvSpPr>
+          <p:cNvPr id="22" name="TextBox 21">
+            <a:extLst>
+              <a:ext uri="{FF2B5EF4-FFF2-40B4-BE49-F238E27FC236}">
+                <a16:creationId xmlns:a16="http://schemas.microsoft.com/office/drawing/2014/main" id="{4B129865-3C69-96A0-92F6-AAA72780AA01}"/>
+              </a:ext>
+            </a:extLst>
+          </p:cNvPr>
+          <p:cNvSpPr txBox="1"/>
+          <p:nvPr/>
+        </p:nvSpPr>
+        <p:spPr>
+          <a:xfrm>
+            <a:off x="5320827" y="1589334"/>
+            <a:ext cx="2247900" cy="369332"/>
+          </a:xfrm>
+          <a:prstGeom prst="rect">
+            <a:avLst/>
+          </a:prstGeom>
+          <a:noFill/>
+        </p:spPr>
+        <p:txBody>
+          <a:bodyPr wrap="square" rtlCol="0">
+            <a:spAutoFit/>
+          </a:bodyPr>
+          <a:lstStyle/>
+          <a:p>
+            <a:pPr algn="ctr"/>
+            <a:r>
+              <a:rPr lang="en-US"/>
+              <a:t>Monitoring</a:t>
+            </a:r>
+            <a:endParaRPr lang="en-CA"/>
+          </a:p>
+        </p:txBody>
+      </p:sp>
+    </p:spTree>
+    <p:extLst>
+      <p:ext uri="{BB962C8B-B14F-4D97-AF65-F5344CB8AC3E}">
+        <p14:creationId xmlns:p14="http://schemas.microsoft.com/office/powerpoint/2010/main" val="1423921415"/>
+      </p:ext>
+    </p:extLst>
+  </p:cSld>
+  <p:clrMapOvr>
+    <a:masterClrMapping/>
+  </p:clrMapOvr>
+</p:sld>
+</file>
+
+<file path=ppt/slides/slide6.xml><?xml version="1.0" encoding="utf-8"?>
+<p:sld xmlns:a="http://schemas.openxmlformats.org/drawingml/2006/main" xmlns:r="http://schemas.openxmlformats.org/officeDocument/2006/relationships" xmlns:p="http://schemas.openxmlformats.org/presentationml/2006/main">
+  <p:cSld>
+    <p:spTree>
+      <p:nvGrpSpPr>
+        <p:cNvPr id="1" name=""/>
+        <p:cNvGrpSpPr/>
+        <p:nvPr/>
+      </p:nvGrpSpPr>
+      <p:grpSpPr>
+        <a:xfrm>
+          <a:off x="0" y="0"/>
+          <a:ext cx="0" cy="0"/>
+          <a:chOff x="0" y="0"/>
+          <a:chExt cx="0" cy="0"/>
+        </a:xfrm>
+      </p:grpSpPr>
+      <p:sp>
+        <p:nvSpPr>
+          <p:cNvPr id="3" name="Title 2">
+            <a:extLst>
+              <a:ext uri="{FF2B5EF4-FFF2-40B4-BE49-F238E27FC236}">
+                <a16:creationId xmlns:a16="http://schemas.microsoft.com/office/drawing/2014/main" id="{EFA3375E-EB34-3EDA-E006-5839B92AF9CB}"/>
+              </a:ext>
+            </a:extLst>
+          </p:cNvPr>
+          <p:cNvSpPr>
+            <a:spLocks noGrp="1"/>
+          </p:cNvSpPr>
+          <p:nvPr>
+            <p:ph type="title"/>
+          </p:nvPr>
+        </p:nvSpPr>
+        <p:spPr>
+          <a:xfrm>
+            <a:off x="8477250" y="603504"/>
+            <a:ext cx="3144774" cy="549155"/>
+          </a:xfrm>
+        </p:spPr>
+        <p:txBody>
+          <a:bodyPr/>
+          <a:lstStyle/>
+          <a:p>
+            <a:r>
+              <a:rPr lang="en-CA"/>
+              <a:t>ML Pipelines </a:t>
+            </a:r>
+          </a:p>
+        </p:txBody>
+      </p:sp>
+      <p:sp>
+        <p:nvSpPr>
+          <p:cNvPr id="4" name="Text Placeholder 3">
+            <a:extLst>
+              <a:ext uri="{FF2B5EF4-FFF2-40B4-BE49-F238E27FC236}">
+                <a16:creationId xmlns:a16="http://schemas.microsoft.com/office/drawing/2014/main" id="{CF738055-F1B2-21E0-49D2-EB8C466E9C05}"/>
+              </a:ext>
+            </a:extLst>
+          </p:cNvPr>
+          <p:cNvSpPr>
+            <a:spLocks noGrp="1"/>
+          </p:cNvSpPr>
+          <p:nvPr>
+            <p:ph type="body" sz="half" idx="2"/>
+          </p:nvPr>
+        </p:nvSpPr>
+        <p:spPr>
+          <a:xfrm>
+            <a:off x="8287555" y="1152659"/>
+            <a:ext cx="3438659" cy="5286778"/>
+          </a:xfrm>
+        </p:spPr>
+        <p:txBody>
+          <a:bodyPr>
+            <a:normAutofit/>
+          </a:bodyPr>
+          <a:lstStyle/>
+          <a:p>
+            <a:pPr marL="285750" indent="-285750">
+              <a:buFont typeface="Arial" panose="020B0604020202020204" pitchFamily="34" charset="0"/>
+              <a:buChar char="•"/>
+            </a:pPr>
+            <a:r>
+              <a:rPr lang="en-CA" sz="1500"/>
+              <a:t>Every stage in an ML pipeline produces some sort of </a:t>
+            </a:r>
+            <a:r>
+              <a:rPr lang="en-CA" sz="1500" b="1"/>
+              <a:t>artifact</a:t>
+            </a:r>
+            <a:r>
+              <a:rPr lang="en-CA" sz="1500"/>
+              <a:t>, whether that artifact is data/metadata, a model, a forecast, etc.</a:t>
+            </a:r>
+          </a:p>
+          <a:p>
+            <a:pPr marL="285750" indent="-285750">
+              <a:buFont typeface="Arial" panose="020B0604020202020204" pitchFamily="34" charset="0"/>
+              <a:buChar char="•"/>
+            </a:pPr>
+            <a:r>
+              <a:rPr lang="en-CA" sz="1500"/>
+              <a:t>Ideally, these artifacts should have some combination of the following properties:</a:t>
+            </a:r>
+          </a:p>
+          <a:p>
+            <a:pPr marL="742950" lvl="1" indent="-285750">
+              <a:buFont typeface="Arial" panose="020B0604020202020204" pitchFamily="34" charset="0"/>
+              <a:buChar char="•"/>
+            </a:pPr>
+            <a:r>
+              <a:rPr lang="en-CA" b="1"/>
+              <a:t>Immutable:</a:t>
+            </a:r>
+            <a:r>
+              <a:rPr lang="en-CA"/>
+              <a:t> An artifact cannot be modified once it has been written. This requires careful namespacing to prevent conflicts.</a:t>
+            </a:r>
+          </a:p>
+          <a:p>
+            <a:pPr marL="742950" lvl="1" indent="-285750">
+              <a:buFont typeface="Arial" panose="020B0604020202020204" pitchFamily="34" charset="0"/>
+              <a:buChar char="•"/>
+            </a:pPr>
+            <a:r>
+              <a:rPr lang="en-CA" b="1"/>
+              <a:t>Reproducible:</a:t>
+            </a:r>
+            <a:r>
+              <a:rPr lang="en-CA"/>
+              <a:t> To the extent possible, artifacts should be a pure function of their inputs.</a:t>
+            </a:r>
+          </a:p>
+          <a:p>
+            <a:pPr marL="742950" lvl="1" indent="-285750">
+              <a:buFont typeface="Arial" panose="020B0604020202020204" pitchFamily="34" charset="0"/>
+              <a:buChar char="•"/>
+            </a:pPr>
+            <a:r>
+              <a:rPr lang="en-CA" b="1"/>
+              <a:t>Durable:</a:t>
+            </a:r>
+            <a:r>
+              <a:rPr lang="en-CA"/>
+              <a:t> Artifacts, and the metadata which produced them, should remain available for as long as any dependent/dependency continues to exist.</a:t>
+            </a:r>
+            <a:endParaRPr lang="en-CA" b="1"/>
           </a:p>
         </p:txBody>
       </p:sp>
       <p:pic>
         <p:nvPicPr>
-          <p:cNvPr id="1028" name="Picture 4">
+          <p:cNvPr id="1026" name="Picture 2" descr="example of a training pipeline on Vertex AI Pipelines using Kubeflow">
             <a:extLst>
               <a:ext uri="{FF2B5EF4-FFF2-40B4-BE49-F238E27FC236}">
-                <a16:creationId xmlns:a16="http://schemas.microsoft.com/office/drawing/2014/main" id="{495EBFEE-46BF-3D9B-1DD9-F1F7981671FF}"/>
+                <a16:creationId xmlns:a16="http://schemas.microsoft.com/office/drawing/2014/main" id="{7A9CBE5D-0ACE-EE69-D40F-1E4247C006C7}"/>
               </a:ext>
             </a:extLst>
           </p:cNvPr>
           <p:cNvPicPr>
-            <a:picLocks noGrp="1" noChangeAspect="1" noChangeArrowheads="1"/>
+            <a:picLocks noChangeAspect="1" noChangeArrowheads="1"/>
           </p:cNvPicPr>
-          <p:nvPr>
-            <p:ph type="pic" idx="1"/>
-          </p:nvPr>
+          <p:nvPr/>
         </p:nvPicPr>
         <p:blipFill>
           <a:blip r:embed="rId2">
@@ -7097,12 +7920,16 @@
               </a:ext>
             </a:extLst>
           </a:blip>
-          <a:srcRect t="8540" b="8540"/>
+          <a:srcRect/>
           <a:stretch>
             <a:fillRect/>
           </a:stretch>
         </p:blipFill>
         <p:spPr bwMode="auto">
+          <a:xfrm>
+            <a:off x="2650499" y="257175"/>
+            <a:ext cx="4057650" cy="6343650"/>
+          </a:xfrm>
           <a:prstGeom prst="rect">
             <a:avLst/>
           </a:prstGeom>
@@ -7121,7 +7948,851 @@
     </p:spTree>
     <p:extLst>
       <p:ext uri="{BB962C8B-B14F-4D97-AF65-F5344CB8AC3E}">
-        <p14:creationId xmlns:p14="http://schemas.microsoft.com/office/powerpoint/2010/main" val="3939276664"/>
+        <p14:creationId xmlns:p14="http://schemas.microsoft.com/office/powerpoint/2010/main" val="2919860233"/>
+      </p:ext>
+    </p:extLst>
+  </p:cSld>
+  <p:clrMapOvr>
+    <a:masterClrMapping/>
+  </p:clrMapOvr>
+</p:sld>
+</file>
+
+<file path=ppt/slides/slide7.xml><?xml version="1.0" encoding="utf-8"?>
+<p:sld xmlns:a="http://schemas.openxmlformats.org/drawingml/2006/main" xmlns:r="http://schemas.openxmlformats.org/officeDocument/2006/relationships" xmlns:p="http://schemas.openxmlformats.org/presentationml/2006/main">
+  <p:cSld>
+    <p:spTree>
+      <p:nvGrpSpPr>
+        <p:cNvPr id="1" name=""/>
+        <p:cNvGrpSpPr/>
+        <p:nvPr/>
+      </p:nvGrpSpPr>
+      <p:grpSpPr>
+        <a:xfrm>
+          <a:off x="0" y="0"/>
+          <a:ext cx="0" cy="0"/>
+          <a:chOff x="0" y="0"/>
+          <a:chExt cx="0" cy="0"/>
+        </a:xfrm>
+      </p:grpSpPr>
+      <p:sp>
+        <p:nvSpPr>
+          <p:cNvPr id="2" name="Title 1">
+            <a:extLst>
+              <a:ext uri="{FF2B5EF4-FFF2-40B4-BE49-F238E27FC236}">
+                <a16:creationId xmlns:a16="http://schemas.microsoft.com/office/drawing/2014/main" id="{7863E0BB-52CE-4652-8F0A-0D5DF7773AF2}"/>
+              </a:ext>
+            </a:extLst>
+          </p:cNvPr>
+          <p:cNvSpPr>
+            <a:spLocks noGrp="1"/>
+          </p:cNvSpPr>
+          <p:nvPr>
+            <p:ph type="title"/>
+          </p:nvPr>
+        </p:nvSpPr>
+        <p:spPr/>
+        <p:txBody>
+          <a:bodyPr/>
+          <a:lstStyle/>
+          <a:p>
+            <a:r>
+              <a:rPr lang="en-US"/>
+              <a:t>Vertex Ai</a:t>
+            </a:r>
+            <a:endParaRPr lang="en-US" dirty="0"/>
+          </a:p>
+        </p:txBody>
+      </p:sp>
+      <p:sp>
+        <p:nvSpPr>
+          <p:cNvPr id="3" name="Text Placeholder 2">
+            <a:extLst>
+              <a:ext uri="{FF2B5EF4-FFF2-40B4-BE49-F238E27FC236}">
+                <a16:creationId xmlns:a16="http://schemas.microsoft.com/office/drawing/2014/main" id="{4288697C-36CA-4301-AF82-974D9E51273D}"/>
+              </a:ext>
+            </a:extLst>
+          </p:cNvPr>
+          <p:cNvSpPr>
+            <a:spLocks noGrp="1"/>
+          </p:cNvSpPr>
+          <p:nvPr>
+            <p:ph type="body" idx="1"/>
+          </p:nvPr>
+        </p:nvSpPr>
+        <p:spPr/>
+        <p:txBody>
+          <a:bodyPr/>
+          <a:lstStyle/>
+          <a:p>
+            <a:r>
+              <a:rPr lang="en-CA"/>
+              <a:t>Hopefully Google doesn’t get bored of this one anytime soon</a:t>
+            </a:r>
+            <a:endParaRPr lang="en-US" dirty="0"/>
+          </a:p>
+        </p:txBody>
+      </p:sp>
+    </p:spTree>
+    <p:extLst>
+      <p:ext uri="{BB962C8B-B14F-4D97-AF65-F5344CB8AC3E}">
+        <p14:creationId xmlns:p14="http://schemas.microsoft.com/office/powerpoint/2010/main" val="2687529475"/>
+      </p:ext>
+    </p:extLst>
+  </p:cSld>
+  <p:clrMapOvr>
+    <a:masterClrMapping/>
+  </p:clrMapOvr>
+</p:sld>
+</file>
+
+<file path=ppt/slides/slide8.xml><?xml version="1.0" encoding="utf-8"?>
+<p:sld xmlns:a="http://schemas.openxmlformats.org/drawingml/2006/main" xmlns:r="http://schemas.openxmlformats.org/officeDocument/2006/relationships" xmlns:p="http://schemas.openxmlformats.org/presentationml/2006/main">
+  <p:cSld>
+    <p:spTree>
+      <p:nvGrpSpPr>
+        <p:cNvPr id="1" name=""/>
+        <p:cNvGrpSpPr/>
+        <p:nvPr/>
+      </p:nvGrpSpPr>
+      <p:grpSpPr>
+        <a:xfrm>
+          <a:off x="0" y="0"/>
+          <a:ext cx="0" cy="0"/>
+          <a:chOff x="0" y="0"/>
+          <a:chExt cx="0" cy="0"/>
+        </a:xfrm>
+      </p:grpSpPr>
+      <p:sp>
+        <p:nvSpPr>
+          <p:cNvPr id="9" name="Title 8">
+            <a:extLst>
+              <a:ext uri="{FF2B5EF4-FFF2-40B4-BE49-F238E27FC236}">
+                <a16:creationId xmlns:a16="http://schemas.microsoft.com/office/drawing/2014/main" id="{6B6ECF17-AC73-A854-6E16-98A083AFB5CB}"/>
+              </a:ext>
+            </a:extLst>
+          </p:cNvPr>
+          <p:cNvSpPr>
+            <a:spLocks noGrp="1"/>
+          </p:cNvSpPr>
+          <p:nvPr>
+            <p:ph type="title"/>
+          </p:nvPr>
+        </p:nvSpPr>
+        <p:spPr>
+          <a:xfrm>
+            <a:off x="8477250" y="603504"/>
+            <a:ext cx="3144774" cy="524905"/>
+          </a:xfrm>
+        </p:spPr>
+        <p:txBody>
+          <a:bodyPr/>
+          <a:lstStyle/>
+          <a:p>
+            <a:r>
+              <a:rPr lang="en-US" sz="2400"/>
+              <a:t>What is Vertex AI?</a:t>
+            </a:r>
+            <a:endParaRPr lang="en-US" sz="2400" dirty="0"/>
+          </a:p>
+        </p:txBody>
+      </p:sp>
+      <p:sp>
+        <p:nvSpPr>
+          <p:cNvPr id="12" name="TextBox 11">
+            <a:extLst>
+              <a:ext uri="{FF2B5EF4-FFF2-40B4-BE49-F238E27FC236}">
+                <a16:creationId xmlns:a16="http://schemas.microsoft.com/office/drawing/2014/main" id="{3507AAD7-6C14-7076-9044-4801CCD4C7EF}"/>
+              </a:ext>
+            </a:extLst>
+          </p:cNvPr>
+          <p:cNvSpPr txBox="1"/>
+          <p:nvPr/>
+        </p:nvSpPr>
+        <p:spPr>
+          <a:xfrm>
+            <a:off x="8385244" y="1495425"/>
+            <a:ext cx="3322506" cy="3970318"/>
+          </a:xfrm>
+          <a:prstGeom prst="rect">
+            <a:avLst/>
+          </a:prstGeom>
+          <a:noFill/>
+        </p:spPr>
+        <p:txBody>
+          <a:bodyPr wrap="square" rtlCol="0">
+            <a:spAutoFit/>
+          </a:bodyPr>
+          <a:lstStyle/>
+          <a:p>
+            <a:pPr marL="285750" indent="-285750">
+              <a:buFont typeface="Arial" panose="020B0604020202020204" pitchFamily="34" charset="0"/>
+              <a:buChar char="•"/>
+            </a:pPr>
+            <a:r>
+              <a:rPr lang="en-US" sz="1400"/>
+              <a:t>Vertex AI is simply an umbrella marketing term for a variety of independent Data/AI-focused GCP services, some new and some old.</a:t>
+            </a:r>
+          </a:p>
+          <a:p>
+            <a:pPr marL="742950" lvl="1" indent="-285750">
+              <a:buFont typeface="Arial" panose="020B0604020202020204" pitchFamily="34" charset="0"/>
+              <a:buChar char="•"/>
+            </a:pPr>
+            <a:r>
+              <a:rPr lang="en-US" sz="1400"/>
+              <a:t>The term “Vertex” doesn’t actually appear in any of the Google Cloud APIs, SDK commands, or Terraform modules, except in docstrings!</a:t>
+            </a:r>
+          </a:p>
+          <a:p>
+            <a:pPr marL="285750" indent="-285750">
+              <a:buFont typeface="Arial" panose="020B0604020202020204" pitchFamily="34" charset="0"/>
+              <a:buChar char="•"/>
+            </a:pPr>
+            <a:r>
+              <a:rPr lang="en-US" sz="1400"/>
+              <a:t>The goal is clearly to unify and highlight synergies between GCP services on the entire “Data⇒Value” journey, to incentivize developers away from more easily-portable “Kubeflow-on-GKE” designs.</a:t>
+            </a:r>
+            <a:endParaRPr lang="en-US" sz="1400" dirty="0"/>
+          </a:p>
+        </p:txBody>
+      </p:sp>
+      <p:pic>
+        <p:nvPicPr>
+          <p:cNvPr id="2" name="Picture 1" descr="Graphical user interface&#10;&#10;Description automatically generated">
+            <a:extLst>
+              <a:ext uri="{FF2B5EF4-FFF2-40B4-BE49-F238E27FC236}">
+                <a16:creationId xmlns:a16="http://schemas.microsoft.com/office/drawing/2014/main" id="{09B0CEB7-1772-A7A5-C63B-825DE241A9EF}"/>
+              </a:ext>
+            </a:extLst>
+          </p:cNvPr>
+          <p:cNvPicPr>
+            <a:picLocks noChangeAspect="1"/>
+          </p:cNvPicPr>
+          <p:nvPr/>
+        </p:nvPicPr>
+        <p:blipFill>
+          <a:blip r:embed="rId2">
+            <a:extLst>
+              <a:ext uri="{28A0092B-C50C-407E-A947-70E740481C1C}">
+                <a14:useLocalDpi xmlns:a14="http://schemas.microsoft.com/office/drawing/2010/main" val="0"/>
+              </a:ext>
+            </a:extLst>
+          </a:blip>
+          <a:stretch>
+            <a:fillRect/>
+          </a:stretch>
+        </p:blipFill>
+        <p:spPr>
+          <a:xfrm>
+            <a:off x="409848" y="1884532"/>
+            <a:ext cx="7198377" cy="3329494"/>
+          </a:xfrm>
+          <a:prstGeom prst="rect">
+            <a:avLst/>
+          </a:prstGeom>
+        </p:spPr>
+      </p:pic>
+    </p:spTree>
+    <p:extLst>
+      <p:ext uri="{BB962C8B-B14F-4D97-AF65-F5344CB8AC3E}">
+        <p14:creationId xmlns:p14="http://schemas.microsoft.com/office/powerpoint/2010/main" val="4274386115"/>
+      </p:ext>
+    </p:extLst>
+  </p:cSld>
+  <p:clrMapOvr>
+    <a:masterClrMapping/>
+  </p:clrMapOvr>
+</p:sld>
+</file>
+
+<file path=ppt/slides/slide9.xml><?xml version="1.0" encoding="utf-8"?>
+<p:sld xmlns:a="http://schemas.openxmlformats.org/drawingml/2006/main" xmlns:r="http://schemas.openxmlformats.org/officeDocument/2006/relationships" xmlns:p="http://schemas.openxmlformats.org/presentationml/2006/main">
+  <p:cSld>
+    <p:spTree>
+      <p:nvGrpSpPr>
+        <p:cNvPr id="1" name=""/>
+        <p:cNvGrpSpPr/>
+        <p:nvPr/>
+      </p:nvGrpSpPr>
+      <p:grpSpPr>
+        <a:xfrm>
+          <a:off x="0" y="0"/>
+          <a:ext cx="0" cy="0"/>
+          <a:chOff x="0" y="0"/>
+          <a:chExt cx="0" cy="0"/>
+        </a:xfrm>
+      </p:grpSpPr>
+      <p:sp>
+        <p:nvSpPr>
+          <p:cNvPr id="15" name="Arrow: Circular 14">
+            <a:extLst>
+              <a:ext uri="{FF2B5EF4-FFF2-40B4-BE49-F238E27FC236}">
+                <a16:creationId xmlns:a16="http://schemas.microsoft.com/office/drawing/2014/main" id="{45DEA589-C81D-703A-B683-859BE2C8AEAC}"/>
+              </a:ext>
+            </a:extLst>
+          </p:cNvPr>
+          <p:cNvSpPr/>
+          <p:nvPr/>
+        </p:nvSpPr>
+        <p:spPr>
+          <a:xfrm>
+            <a:off x="340468" y="1506330"/>
+            <a:ext cx="7684851" cy="4310809"/>
+          </a:xfrm>
+          <a:prstGeom prst="circularArrow">
+            <a:avLst>
+              <a:gd name="adj1" fmla="val 6445"/>
+              <a:gd name="adj2" fmla="val 704844"/>
+              <a:gd name="adj3" fmla="val 20095681"/>
+              <a:gd name="adj4" fmla="val 814020"/>
+              <a:gd name="adj5" fmla="val 10269"/>
+            </a:avLst>
+          </a:prstGeom>
+          <a:solidFill>
+            <a:schemeClr val="accent2">
+              <a:lumMod val="40000"/>
+              <a:lumOff val="60000"/>
+            </a:schemeClr>
+          </a:solidFill>
+          <a:ln>
+            <a:solidFill>
+              <a:schemeClr val="accent2">
+                <a:lumMod val="75000"/>
+              </a:schemeClr>
+            </a:solidFill>
+          </a:ln>
+          <a:effectLst>
+            <a:outerShdw blurRad="50800" dist="38100" dir="5400000" algn="t" rotWithShape="0">
+              <a:prstClr val="black">
+                <a:alpha val="40000"/>
+              </a:prstClr>
+            </a:outerShdw>
+          </a:effectLst>
+        </p:spPr>
+        <p:style>
+          <a:lnRef idx="2">
+            <a:schemeClr val="accent1">
+              <a:shade val="50000"/>
+            </a:schemeClr>
+          </a:lnRef>
+          <a:fillRef idx="1">
+            <a:schemeClr val="accent1"/>
+          </a:fillRef>
+          <a:effectRef idx="0">
+            <a:schemeClr val="accent1"/>
+          </a:effectRef>
+          <a:fontRef idx="minor">
+            <a:schemeClr val="lt1"/>
+          </a:fontRef>
+        </p:style>
+        <p:txBody>
+          <a:bodyPr rtlCol="0" anchor="t"/>
+          <a:lstStyle/>
+          <a:p>
+            <a:pPr algn="ctr"/>
+            <a:endParaRPr lang="en-CA">
+              <a:solidFill>
+                <a:schemeClr val="tx1"/>
+              </a:solidFill>
+            </a:endParaRPr>
+          </a:p>
+        </p:txBody>
+      </p:sp>
+      <p:sp>
+        <p:nvSpPr>
+          <p:cNvPr id="9" name="Title 8">
+            <a:extLst>
+              <a:ext uri="{FF2B5EF4-FFF2-40B4-BE49-F238E27FC236}">
+                <a16:creationId xmlns:a16="http://schemas.microsoft.com/office/drawing/2014/main" id="{6B6ECF17-AC73-A854-6E16-98A083AFB5CB}"/>
+              </a:ext>
+            </a:extLst>
+          </p:cNvPr>
+          <p:cNvSpPr>
+            <a:spLocks noGrp="1"/>
+          </p:cNvSpPr>
+          <p:nvPr>
+            <p:ph type="title"/>
+          </p:nvPr>
+        </p:nvSpPr>
+        <p:spPr>
+          <a:xfrm>
+            <a:off x="8477250" y="603504"/>
+            <a:ext cx="3144774" cy="524905"/>
+          </a:xfrm>
+        </p:spPr>
+        <p:txBody>
+          <a:bodyPr/>
+          <a:lstStyle/>
+          <a:p>
+            <a:r>
+              <a:rPr lang="en-US" sz="2400"/>
+              <a:t>Machine Learning Lifecycle</a:t>
+            </a:r>
+            <a:endParaRPr lang="en-US" sz="2400" dirty="0"/>
+          </a:p>
+        </p:txBody>
+      </p:sp>
+      <p:sp>
+        <p:nvSpPr>
+          <p:cNvPr id="12" name="TextBox 11">
+            <a:extLst>
+              <a:ext uri="{FF2B5EF4-FFF2-40B4-BE49-F238E27FC236}">
+                <a16:creationId xmlns:a16="http://schemas.microsoft.com/office/drawing/2014/main" id="{3507AAD7-6C14-7076-9044-4801CCD4C7EF}"/>
+              </a:ext>
+            </a:extLst>
+          </p:cNvPr>
+          <p:cNvSpPr txBox="1"/>
+          <p:nvPr/>
+        </p:nvSpPr>
+        <p:spPr>
+          <a:xfrm>
+            <a:off x="8562975" y="1495425"/>
+            <a:ext cx="3144774" cy="2031325"/>
+          </a:xfrm>
+          <a:prstGeom prst="rect">
+            <a:avLst/>
+          </a:prstGeom>
+          <a:noFill/>
+        </p:spPr>
+        <p:txBody>
+          <a:bodyPr wrap="square" rtlCol="0">
+            <a:spAutoFit/>
+          </a:bodyPr>
+          <a:lstStyle/>
+          <a:p>
+            <a:r>
+              <a:rPr lang="en-US"/>
+              <a:t>Unlike traditional software systems that operate deterministically according to requirements and algorithms that are determined </a:t>
+            </a:r>
+            <a:endParaRPr lang="en-CA"/>
+          </a:p>
+        </p:txBody>
+      </p:sp>
+      <p:sp>
+        <p:nvSpPr>
+          <p:cNvPr id="19" name="TextBox 18">
+            <a:extLst>
+              <a:ext uri="{FF2B5EF4-FFF2-40B4-BE49-F238E27FC236}">
+                <a16:creationId xmlns:a16="http://schemas.microsoft.com/office/drawing/2014/main" id="{653D03A6-9A32-052E-30DC-DE8EB5C71DEF}"/>
+              </a:ext>
+            </a:extLst>
+          </p:cNvPr>
+          <p:cNvSpPr txBox="1"/>
+          <p:nvPr/>
+        </p:nvSpPr>
+        <p:spPr>
+          <a:xfrm>
+            <a:off x="5777418" y="5281077"/>
+            <a:ext cx="2247900" cy="369332"/>
+          </a:xfrm>
+          <a:prstGeom prst="rect">
+            <a:avLst/>
+          </a:prstGeom>
+          <a:noFill/>
+        </p:spPr>
+        <p:txBody>
+          <a:bodyPr wrap="square" rtlCol="0">
+            <a:spAutoFit/>
+          </a:bodyPr>
+          <a:lstStyle/>
+          <a:p>
+            <a:pPr algn="r"/>
+            <a:r>
+              <a:rPr lang="en-US"/>
+              <a:t>Feature Extraction</a:t>
+            </a:r>
+            <a:endParaRPr lang="en-CA"/>
+          </a:p>
+        </p:txBody>
+      </p:sp>
+      <p:sp>
+        <p:nvSpPr>
+          <p:cNvPr id="20" name="TextBox 19">
+            <a:extLst>
+              <a:ext uri="{FF2B5EF4-FFF2-40B4-BE49-F238E27FC236}">
+                <a16:creationId xmlns:a16="http://schemas.microsoft.com/office/drawing/2014/main" id="{1AA3310C-2580-E03B-B074-B51AA6D93A83}"/>
+              </a:ext>
+            </a:extLst>
+          </p:cNvPr>
+          <p:cNvSpPr txBox="1"/>
+          <p:nvPr/>
+        </p:nvSpPr>
+        <p:spPr>
+          <a:xfrm>
+            <a:off x="212791" y="5270171"/>
+            <a:ext cx="2247900" cy="369332"/>
+          </a:xfrm>
+          <a:prstGeom prst="rect">
+            <a:avLst/>
+          </a:prstGeom>
+          <a:noFill/>
+        </p:spPr>
+        <p:txBody>
+          <a:bodyPr wrap="square" rtlCol="0">
+            <a:spAutoFit/>
+          </a:bodyPr>
+          <a:lstStyle/>
+          <a:p>
+            <a:pPr algn="ctr"/>
+            <a:r>
+              <a:rPr lang="en-US"/>
+              <a:t>Training</a:t>
+            </a:r>
+            <a:endParaRPr lang="en-CA"/>
+          </a:p>
+        </p:txBody>
+      </p:sp>
+      <p:sp>
+        <p:nvSpPr>
+          <p:cNvPr id="21" name="TextBox 20">
+            <a:extLst>
+              <a:ext uri="{FF2B5EF4-FFF2-40B4-BE49-F238E27FC236}">
+                <a16:creationId xmlns:a16="http://schemas.microsoft.com/office/drawing/2014/main" id="{2B327E6D-FB04-0B20-D2B9-D2D5C5C3B8EB}"/>
+              </a:ext>
+            </a:extLst>
+          </p:cNvPr>
+          <p:cNvSpPr txBox="1"/>
+          <p:nvPr/>
+        </p:nvSpPr>
+        <p:spPr>
+          <a:xfrm>
+            <a:off x="910345" y="1506330"/>
+            <a:ext cx="2247900" cy="369332"/>
+          </a:xfrm>
+          <a:prstGeom prst="rect">
+            <a:avLst/>
+          </a:prstGeom>
+          <a:noFill/>
+        </p:spPr>
+        <p:txBody>
+          <a:bodyPr wrap="square" rtlCol="0">
+            <a:spAutoFit/>
+          </a:bodyPr>
+          <a:lstStyle/>
+          <a:p>
+            <a:pPr algn="ctr"/>
+            <a:r>
+              <a:rPr lang="en-US"/>
+              <a:t>Inference</a:t>
+            </a:r>
+            <a:endParaRPr lang="en-CA"/>
+          </a:p>
+        </p:txBody>
+      </p:sp>
+      <p:sp>
+        <p:nvSpPr>
+          <p:cNvPr id="22" name="TextBox 21">
+            <a:extLst>
+              <a:ext uri="{FF2B5EF4-FFF2-40B4-BE49-F238E27FC236}">
+                <a16:creationId xmlns:a16="http://schemas.microsoft.com/office/drawing/2014/main" id="{4B129865-3C69-96A0-92F6-AAA72780AA01}"/>
+              </a:ext>
+            </a:extLst>
+          </p:cNvPr>
+          <p:cNvSpPr txBox="1"/>
+          <p:nvPr/>
+        </p:nvSpPr>
+        <p:spPr>
+          <a:xfrm>
+            <a:off x="5320827" y="1589334"/>
+            <a:ext cx="2247900" cy="369332"/>
+          </a:xfrm>
+          <a:prstGeom prst="rect">
+            <a:avLst/>
+          </a:prstGeom>
+          <a:noFill/>
+        </p:spPr>
+        <p:txBody>
+          <a:bodyPr wrap="square" rtlCol="0">
+            <a:spAutoFit/>
+          </a:bodyPr>
+          <a:lstStyle/>
+          <a:p>
+            <a:pPr algn="ctr"/>
+            <a:r>
+              <a:rPr lang="en-US"/>
+              <a:t>Monitoring</a:t>
+            </a:r>
+            <a:endParaRPr lang="en-CA"/>
+          </a:p>
+        </p:txBody>
+      </p:sp>
+      <p:pic>
+        <p:nvPicPr>
+          <p:cNvPr id="13" name="Graphic 12">
+            <a:extLst>
+              <a:ext uri="{FF2B5EF4-FFF2-40B4-BE49-F238E27FC236}">
+                <a16:creationId xmlns:a16="http://schemas.microsoft.com/office/drawing/2014/main" id="{777B50D0-C8A6-3017-D2F9-5E119B968490}"/>
+              </a:ext>
+            </a:extLst>
+          </p:cNvPr>
+          <p:cNvPicPr>
+            <a:picLocks noChangeAspect="1"/>
+          </p:cNvPicPr>
+          <p:nvPr/>
+        </p:nvPicPr>
+        <p:blipFill>
+          <a:blip r:embed="rId2">
+            <a:extLst>
+              <a:ext uri="{96DAC541-7B7A-43D3-8B79-37D633B846F1}">
+                <asvg:svgBlip xmlns:asvg="http://schemas.microsoft.com/office/drawing/2016/SVG/main" r:embed="rId3"/>
+              </a:ext>
+            </a:extLst>
+          </a:blip>
+          <a:stretch>
+            <a:fillRect/>
+          </a:stretch>
+        </p:blipFill>
+        <p:spPr>
+          <a:xfrm>
+            <a:off x="6608524" y="3005117"/>
+            <a:ext cx="1313234" cy="1313234"/>
+          </a:xfrm>
+          <a:prstGeom prst="rect">
+            <a:avLst/>
+          </a:prstGeom>
+        </p:spPr>
+      </p:pic>
+      <p:pic>
+        <p:nvPicPr>
+          <p:cNvPr id="1032" name="Picture 8" descr="Google Cloud AutoML">
+            <a:extLst>
+              <a:ext uri="{FF2B5EF4-FFF2-40B4-BE49-F238E27FC236}">
+                <a16:creationId xmlns:a16="http://schemas.microsoft.com/office/drawing/2014/main" id="{91709BD1-52B8-94C1-CFB4-AD642321EC62}"/>
+              </a:ext>
+            </a:extLst>
+          </p:cNvPr>
+          <p:cNvPicPr>
+            <a:picLocks noChangeAspect="1" noChangeArrowheads="1"/>
+          </p:cNvPicPr>
+          <p:nvPr/>
+        </p:nvPicPr>
+        <p:blipFill>
+          <a:blip r:embed="rId4">
+            <a:extLst>
+              <a:ext uri="{28A0092B-C50C-407E-A947-70E740481C1C}">
+                <a14:useLocalDpi xmlns:a14="http://schemas.microsoft.com/office/drawing/2010/main" val="0"/>
+              </a:ext>
+            </a:extLst>
+          </a:blip>
+          <a:srcRect/>
+          <a:stretch>
+            <a:fillRect/>
+          </a:stretch>
+        </p:blipFill>
+        <p:spPr bwMode="auto">
+          <a:xfrm>
+            <a:off x="3158245" y="4157399"/>
+            <a:ext cx="1194271" cy="1194271"/>
+          </a:xfrm>
+          <a:prstGeom prst="rect">
+            <a:avLst/>
+          </a:prstGeom>
+          <a:noFill/>
+          <a:extLst>
+            <a:ext uri="{909E8E84-426E-40DD-AFC4-6F175D3DCCD1}">
+              <a14:hiddenFill xmlns:a14="http://schemas.microsoft.com/office/drawing/2010/main">
+                <a:solidFill>
+                  <a:srgbClr val="FFFFFF"/>
+                </a:solidFill>
+              </a14:hiddenFill>
+            </a:ext>
+          </a:extLst>
+        </p:spPr>
+      </p:pic>
+      <p:pic>
+        <p:nvPicPr>
+          <p:cNvPr id="1034" name="Picture 10" descr="Python Logo transparent PNG - StickPNG">
+            <a:extLst>
+              <a:ext uri="{FF2B5EF4-FFF2-40B4-BE49-F238E27FC236}">
+                <a16:creationId xmlns:a16="http://schemas.microsoft.com/office/drawing/2014/main" id="{482A3B94-1E53-6AD4-3A3B-21A725979521}"/>
+              </a:ext>
+            </a:extLst>
+          </p:cNvPr>
+          <p:cNvPicPr>
+            <a:picLocks noChangeAspect="1" noChangeArrowheads="1"/>
+          </p:cNvPicPr>
+          <p:nvPr/>
+        </p:nvPicPr>
+        <p:blipFill>
+          <a:blip r:embed="rId5">
+            <a:extLst>
+              <a:ext uri="{28A0092B-C50C-407E-A947-70E740481C1C}">
+                <a14:useLocalDpi xmlns:a14="http://schemas.microsoft.com/office/drawing/2010/main" val="0"/>
+              </a:ext>
+            </a:extLst>
+          </a:blip>
+          <a:srcRect/>
+          <a:stretch>
+            <a:fillRect/>
+          </a:stretch>
+        </p:blipFill>
+        <p:spPr bwMode="auto">
+          <a:xfrm>
+            <a:off x="4117303" y="5281077"/>
+            <a:ext cx="1203524" cy="1198841"/>
+          </a:xfrm>
+          <a:prstGeom prst="rect">
+            <a:avLst/>
+          </a:prstGeom>
+          <a:noFill/>
+          <a:extLst>
+            <a:ext uri="{909E8E84-426E-40DD-AFC4-6F175D3DCCD1}">
+              <a14:hiddenFill xmlns:a14="http://schemas.microsoft.com/office/drawing/2010/main">
+                <a:solidFill>
+                  <a:srgbClr val="FFFFFF"/>
+                </a:solidFill>
+              </a14:hiddenFill>
+            </a:ext>
+          </a:extLst>
+        </p:spPr>
+      </p:pic>
+      <p:sp>
+        <p:nvSpPr>
+          <p:cNvPr id="23" name="Rectangle 22">
+            <a:extLst>
+              <a:ext uri="{FF2B5EF4-FFF2-40B4-BE49-F238E27FC236}">
+                <a16:creationId xmlns:a16="http://schemas.microsoft.com/office/drawing/2014/main" id="{7085C738-CED9-D6D6-5CFA-1ACC5D524633}"/>
+              </a:ext>
+            </a:extLst>
+          </p:cNvPr>
+          <p:cNvSpPr/>
+          <p:nvPr/>
+        </p:nvSpPr>
+        <p:spPr>
+          <a:xfrm rot="20293634">
+            <a:off x="2825487" y="5223348"/>
+            <a:ext cx="2860776" cy="199098"/>
+          </a:xfrm>
+          <a:prstGeom prst="rect">
+            <a:avLst/>
+          </a:prstGeom>
+          <a:scene3d>
+            <a:camera prst="isometricOffAxis1Top"/>
+            <a:lightRig rig="threePt" dir="t"/>
+          </a:scene3d>
+        </p:spPr>
+        <p:style>
+          <a:lnRef idx="3">
+            <a:schemeClr val="lt1"/>
+          </a:lnRef>
+          <a:fillRef idx="1">
+            <a:schemeClr val="accent3"/>
+          </a:fillRef>
+          <a:effectRef idx="1">
+            <a:schemeClr val="accent3"/>
+          </a:effectRef>
+          <a:fontRef idx="minor">
+            <a:schemeClr val="lt1"/>
+          </a:fontRef>
+        </p:style>
+        <p:txBody>
+          <a:bodyPr rtlCol="0" anchor="ctr"/>
+          <a:lstStyle/>
+          <a:p>
+            <a:pPr algn="ctr"/>
+            <a:endParaRPr lang="en-CA"/>
+          </a:p>
+        </p:txBody>
+      </p:sp>
+      <p:pic>
+        <p:nvPicPr>
+          <p:cNvPr id="1038" name="Picture 14" descr="Imaginary Cloud: Web, Mobile, UI/UX Design &amp; AI Development">
+            <a:extLst>
+              <a:ext uri="{FF2B5EF4-FFF2-40B4-BE49-F238E27FC236}">
+                <a16:creationId xmlns:a16="http://schemas.microsoft.com/office/drawing/2014/main" id="{D91DC787-BFD6-39F6-84F8-E6044471A328}"/>
+              </a:ext>
+            </a:extLst>
+          </p:cNvPr>
+          <p:cNvPicPr>
+            <a:picLocks noChangeAspect="1" noChangeArrowheads="1"/>
+          </p:cNvPicPr>
+          <p:nvPr/>
+        </p:nvPicPr>
+        <p:blipFill>
+          <a:blip r:embed="rId6">
+            <a:extLst>
+              <a:ext uri="{28A0092B-C50C-407E-A947-70E740481C1C}">
+                <a14:useLocalDpi xmlns:a14="http://schemas.microsoft.com/office/drawing/2010/main" val="0"/>
+              </a:ext>
+            </a:extLst>
+          </a:blip>
+          <a:srcRect/>
+          <a:stretch>
+            <a:fillRect/>
+          </a:stretch>
+        </p:blipFill>
+        <p:spPr bwMode="auto">
+          <a:xfrm>
+            <a:off x="284214" y="2831864"/>
+            <a:ext cx="1052527" cy="1194271"/>
+          </a:xfrm>
+          <a:prstGeom prst="rect">
+            <a:avLst/>
+          </a:prstGeom>
+          <a:noFill/>
+          <a:extLst>
+            <a:ext uri="{909E8E84-426E-40DD-AFC4-6F175D3DCCD1}">
+              <a14:hiddenFill xmlns:a14="http://schemas.microsoft.com/office/drawing/2010/main">
+                <a:solidFill>
+                  <a:srgbClr val="FFFFFF"/>
+                </a:solidFill>
+              </a14:hiddenFill>
+            </a:ext>
+          </a:extLst>
+        </p:spPr>
+      </p:pic>
+      <p:pic>
+        <p:nvPicPr>
+          <p:cNvPr id="1040" name="Picture 16">
+            <a:extLst>
+              <a:ext uri="{FF2B5EF4-FFF2-40B4-BE49-F238E27FC236}">
+                <a16:creationId xmlns:a16="http://schemas.microsoft.com/office/drawing/2014/main" id="{EFF4432E-0572-355C-EB7A-83E2753903E1}"/>
+              </a:ext>
+            </a:extLst>
+          </p:cNvPr>
+          <p:cNvPicPr>
+            <a:picLocks noChangeAspect="1" noChangeArrowheads="1"/>
+          </p:cNvPicPr>
+          <p:nvPr/>
+        </p:nvPicPr>
+        <p:blipFill>
+          <a:blip r:embed="rId7">
+            <a:extLst>
+              <a:ext uri="{28A0092B-C50C-407E-A947-70E740481C1C}">
+                <a14:useLocalDpi xmlns:a14="http://schemas.microsoft.com/office/drawing/2010/main" val="0"/>
+              </a:ext>
+            </a:extLst>
+          </a:blip>
+          <a:srcRect/>
+          <a:stretch>
+            <a:fillRect/>
+          </a:stretch>
+        </p:blipFill>
+        <p:spPr bwMode="auto">
+          <a:xfrm>
+            <a:off x="3072927" y="705812"/>
+            <a:ext cx="2247900" cy="1168440"/>
+          </a:xfrm>
+          <a:prstGeom prst="rect">
+            <a:avLst/>
+          </a:prstGeom>
+          <a:noFill/>
+          <a:extLst>
+            <a:ext uri="{909E8E84-426E-40DD-AFC4-6F175D3DCCD1}">
+              <a14:hiddenFill xmlns:a14="http://schemas.microsoft.com/office/drawing/2010/main">
+                <a:solidFill>
+                  <a:srgbClr val="FFFFFF"/>
+                </a:solidFill>
+              </a14:hiddenFill>
+            </a:ext>
+          </a:extLst>
+        </p:spPr>
+      </p:pic>
+    </p:spTree>
+    <p:extLst>
+      <p:ext uri="{BB962C8B-B14F-4D97-AF65-F5344CB8AC3E}">
+        <p14:creationId xmlns:p14="http://schemas.microsoft.com/office/powerpoint/2010/main" val="672058878"/>
       </p:ext>
     </p:extLst>
   </p:cSld>

</xml_diff>

<commit_message>
Add some MLflow-related slides
</commit_message>
<xml_diff>
--- a/Day 3-4.pptx
+++ b/Day 3-4.pptx
@@ -5,10 +5,10 @@
     <p:sldMasterId id="2147483673" r:id="rId4"/>
   </p:sldMasterIdLst>
   <p:notesMasterIdLst>
-    <p:notesMasterId r:id="rId14"/>
+    <p:notesMasterId r:id="rId18"/>
   </p:notesMasterIdLst>
   <p:handoutMasterIdLst>
-    <p:handoutMasterId r:id="rId15"/>
+    <p:handoutMasterId r:id="rId19"/>
   </p:handoutMasterIdLst>
   <p:sldIdLst>
     <p:sldId id="257" r:id="rId5"/>
@@ -16,10 +16,14 @@
     <p:sldId id="262" r:id="rId7"/>
     <p:sldId id="270" r:id="rId8"/>
     <p:sldId id="271" r:id="rId9"/>
-    <p:sldId id="489" r:id="rId10"/>
-    <p:sldId id="486" r:id="rId11"/>
-    <p:sldId id="487" r:id="rId12"/>
-    <p:sldId id="488" r:id="rId13"/>
+    <p:sldId id="490" r:id="rId10"/>
+    <p:sldId id="491" r:id="rId11"/>
+    <p:sldId id="492" r:id="rId12"/>
+    <p:sldId id="493" r:id="rId13"/>
+    <p:sldId id="489" r:id="rId14"/>
+    <p:sldId id="486" r:id="rId15"/>
+    <p:sldId id="487" r:id="rId16"/>
+    <p:sldId id="488" r:id="rId17"/>
   </p:sldIdLst>
   <p:sldSz cx="12192000" cy="6858000"/>
   <p:notesSz cx="6858000" cy="9144000"/>
@@ -220,7 +224,7 @@
           <a:p>
             <a:fld id="{2FE516B2-C096-46B8-BF82-53365F257CA4}" type="datetimeFigureOut">
               <a:rPr lang="en-CA" smtClean="0"/>
-              <a:t>2023-03-16</a:t>
+              <a:t>2024-02-15</a:t>
             </a:fld>
             <a:endParaRPr lang="en-CA"/>
           </a:p>
@@ -398,7 +402,7 @@
           <a:p>
             <a:fld id="{98592766-6D16-4BDE-A3D4-3C8E7677E7B5}" type="datetimeFigureOut">
               <a:rPr lang="en-CA" smtClean="0"/>
-              <a:t>2023-03-16</a:t>
+              <a:t>2024-02-15</a:t>
             </a:fld>
             <a:endParaRPr lang="en-CA"/>
           </a:p>
@@ -1246,7 +1250,7 @@
           <a:p>
             <a:fld id="{EA0C0817-A112-4847-8014-A94B7D2A4EA3}" type="datetime1">
               <a:rPr lang="en-US" smtClean="0"/>
-              <a:t>3/16/2023</a:t>
+              <a:t>2/15/24</a:t>
             </a:fld>
             <a:endParaRPr lang="en-US"/>
           </a:p>
@@ -1446,7 +1450,7 @@
           <a:p>
             <a:fld id="{7332B432-ACDA-4023-A761-2BAB76577B62}" type="datetime1">
               <a:rPr lang="en-US" smtClean="0"/>
-              <a:t>3/16/2023</a:t>
+              <a:t>2/15/24</a:t>
             </a:fld>
             <a:endParaRPr lang="en-US"/>
           </a:p>
@@ -2044,7 +2048,7 @@
           <a:p>
             <a:fld id="{D9C646AA-F36E-4540-911D-FFFC0A0EF24A}" type="datetime1">
               <a:rPr lang="en-US" smtClean="0"/>
-              <a:t>3/16/2023</a:t>
+              <a:t>2/15/24</a:t>
             </a:fld>
             <a:endParaRPr lang="en-US"/>
           </a:p>
@@ -2361,7 +2365,7 @@
           <a:p>
             <a:fld id="{69186D26-FA5F-4637-B602-B7C2DC34CFD4}" type="datetime1">
               <a:rPr lang="en-US" smtClean="0"/>
-              <a:t>3/16/2023</a:t>
+              <a:t>2/15/24</a:t>
             </a:fld>
             <a:endParaRPr lang="en-US"/>
           </a:p>
@@ -2795,7 +2799,7 @@
           <a:p>
             <a:fld id="{8A7F15D8-96D1-4781-BC50-CA8A088B2FE4}" type="datetime1">
               <a:rPr lang="en-US" smtClean="0"/>
-              <a:t>3/16/2023</a:t>
+              <a:t>2/15/24</a:t>
             </a:fld>
             <a:endParaRPr lang="en-US"/>
           </a:p>
@@ -2912,7 +2916,7 @@
           <a:p>
             <a:fld id="{F9A96C99-B8F8-4528-BD05-0E16E943DC09}" type="datetime1">
               <a:rPr lang="en-US" smtClean="0"/>
-              <a:t>3/16/2023</a:t>
+              <a:t>2/15/24</a:t>
             </a:fld>
             <a:endParaRPr lang="en-US"/>
           </a:p>
@@ -3007,7 +3011,7 @@
           <a:p>
             <a:fld id="{03636942-C211-4B28-8DBD-C953E00AF71B}" type="datetime1">
               <a:rPr lang="en-US" smtClean="0"/>
-              <a:t>3/16/2023</a:t>
+              <a:t>2/15/24</a:t>
             </a:fld>
             <a:endParaRPr lang="en-US"/>
           </a:p>
@@ -3422,7 +3426,7 @@
           <a:p>
             <a:fld id="{7E8D12A6-918A-48BD-8CB9-CA713993B0EA}" type="datetime1">
               <a:rPr lang="en-US" smtClean="0"/>
-              <a:t>3/16/2023</a:t>
+              <a:t>2/15/24</a:t>
             </a:fld>
             <a:endParaRPr lang="en-US"/>
           </a:p>
@@ -3683,7 +3687,7 @@
             <a:fld id="{E778CE86-875F-4587-BCF6-FA054AFC0D53}" type="datetime1">
               <a:rPr lang="en-US" smtClean="0"/>
               <a:pPr/>
-              <a:t>3/16/2023</a:t>
+              <a:t>2/15/24</a:t>
             </a:fld>
             <a:endParaRPr lang="en-US"/>
           </a:p>
@@ -4196,7 +4200,7 @@
           <a:p>
             <a:fld id="{F6FA2B21-3FCD-4721-B95C-427943F61125}" type="datetime1">
               <a:rPr lang="en-US" smtClean="0"/>
-              <a:t>3/16/2023</a:t>
+              <a:t>2/15/24</a:t>
             </a:fld>
             <a:endParaRPr lang="en-US"/>
           </a:p>
@@ -4891,6 +4895,1060 @@
 </p:sld>
 </file>
 
+<file path=ppt/slides/slide10.xml><?xml version="1.0" encoding="utf-8"?>
+<p:sld xmlns:a="http://schemas.openxmlformats.org/drawingml/2006/main" xmlns:r="http://schemas.openxmlformats.org/officeDocument/2006/relationships" xmlns:p="http://schemas.openxmlformats.org/presentationml/2006/main">
+  <p:cSld>
+    <p:spTree>
+      <p:nvGrpSpPr>
+        <p:cNvPr id="1" name=""/>
+        <p:cNvGrpSpPr/>
+        <p:nvPr/>
+      </p:nvGrpSpPr>
+      <p:grpSpPr>
+        <a:xfrm>
+          <a:off x="0" y="0"/>
+          <a:ext cx="0" cy="0"/>
+          <a:chOff x="0" y="0"/>
+          <a:chExt cx="0" cy="0"/>
+        </a:xfrm>
+      </p:grpSpPr>
+      <p:sp>
+        <p:nvSpPr>
+          <p:cNvPr id="3" name="Title 2">
+            <a:extLst>
+              <a:ext uri="{FF2B5EF4-FFF2-40B4-BE49-F238E27FC236}">
+                <a16:creationId xmlns:a16="http://schemas.microsoft.com/office/drawing/2014/main" id="{EFA3375E-EB34-3EDA-E006-5839B92AF9CB}"/>
+              </a:ext>
+            </a:extLst>
+          </p:cNvPr>
+          <p:cNvSpPr>
+            <a:spLocks noGrp="1"/>
+          </p:cNvSpPr>
+          <p:nvPr>
+            <p:ph type="title"/>
+          </p:nvPr>
+        </p:nvSpPr>
+        <p:spPr>
+          <a:xfrm>
+            <a:off x="8477250" y="603504"/>
+            <a:ext cx="3144774" cy="549155"/>
+          </a:xfrm>
+        </p:spPr>
+        <p:txBody>
+          <a:bodyPr/>
+          <a:lstStyle/>
+          <a:p>
+            <a:r>
+              <a:rPr lang="en-CA"/>
+              <a:t>ML Pipelines </a:t>
+            </a:r>
+          </a:p>
+        </p:txBody>
+      </p:sp>
+      <p:sp>
+        <p:nvSpPr>
+          <p:cNvPr id="4" name="Text Placeholder 3">
+            <a:extLst>
+              <a:ext uri="{FF2B5EF4-FFF2-40B4-BE49-F238E27FC236}">
+                <a16:creationId xmlns:a16="http://schemas.microsoft.com/office/drawing/2014/main" id="{CF738055-F1B2-21E0-49D2-EB8C466E9C05}"/>
+              </a:ext>
+            </a:extLst>
+          </p:cNvPr>
+          <p:cNvSpPr>
+            <a:spLocks noGrp="1"/>
+          </p:cNvSpPr>
+          <p:nvPr>
+            <p:ph type="body" sz="half" idx="2"/>
+          </p:nvPr>
+        </p:nvSpPr>
+        <p:spPr>
+          <a:xfrm>
+            <a:off x="8287555" y="1152659"/>
+            <a:ext cx="3438659" cy="5286778"/>
+          </a:xfrm>
+        </p:spPr>
+        <p:txBody>
+          <a:bodyPr>
+            <a:normAutofit/>
+          </a:bodyPr>
+          <a:lstStyle/>
+          <a:p>
+            <a:pPr marL="285750" indent="-285750">
+              <a:buFont typeface="Arial" panose="020B0604020202020204" pitchFamily="34" charset="0"/>
+              <a:buChar char="•"/>
+            </a:pPr>
+            <a:r>
+              <a:rPr lang="en-CA" sz="1500"/>
+              <a:t>Every stage in an ML pipeline produces some sort of </a:t>
+            </a:r>
+            <a:r>
+              <a:rPr lang="en-CA" sz="1500" b="1"/>
+              <a:t>artifact</a:t>
+            </a:r>
+            <a:r>
+              <a:rPr lang="en-CA" sz="1500"/>
+              <a:t>, whether that artifact is data/metadata, a model, a forecast, etc.</a:t>
+            </a:r>
+          </a:p>
+          <a:p>
+            <a:pPr marL="285750" indent="-285750">
+              <a:buFont typeface="Arial" panose="020B0604020202020204" pitchFamily="34" charset="0"/>
+              <a:buChar char="•"/>
+            </a:pPr>
+            <a:r>
+              <a:rPr lang="en-CA" sz="1500"/>
+              <a:t>Ideally, these artifacts should have some combination of the following properties:</a:t>
+            </a:r>
+          </a:p>
+          <a:p>
+            <a:pPr marL="742950" lvl="1" indent="-285750">
+              <a:buFont typeface="Arial" panose="020B0604020202020204" pitchFamily="34" charset="0"/>
+              <a:buChar char="•"/>
+            </a:pPr>
+            <a:r>
+              <a:rPr lang="en-CA" b="1"/>
+              <a:t>Immutable:</a:t>
+            </a:r>
+            <a:r>
+              <a:rPr lang="en-CA"/>
+              <a:t> An artifact cannot be modified once it has been written. This requires careful namespacing to prevent conflicts.</a:t>
+            </a:r>
+          </a:p>
+          <a:p>
+            <a:pPr marL="742950" lvl="1" indent="-285750">
+              <a:buFont typeface="Arial" panose="020B0604020202020204" pitchFamily="34" charset="0"/>
+              <a:buChar char="•"/>
+            </a:pPr>
+            <a:r>
+              <a:rPr lang="en-CA" b="1"/>
+              <a:t>Reproducible:</a:t>
+            </a:r>
+            <a:r>
+              <a:rPr lang="en-CA"/>
+              <a:t> To the extent possible, artifacts should be a pure function of their inputs.</a:t>
+            </a:r>
+          </a:p>
+          <a:p>
+            <a:pPr marL="742950" lvl="1" indent="-285750">
+              <a:buFont typeface="Arial" panose="020B0604020202020204" pitchFamily="34" charset="0"/>
+              <a:buChar char="•"/>
+            </a:pPr>
+            <a:r>
+              <a:rPr lang="en-CA" b="1"/>
+              <a:t>Durable:</a:t>
+            </a:r>
+            <a:r>
+              <a:rPr lang="en-CA"/>
+              <a:t> Artifacts, and the metadata which produced them, should remain available for as long as any dependent/dependency continues to exist.</a:t>
+            </a:r>
+            <a:endParaRPr lang="en-CA" b="1"/>
+          </a:p>
+        </p:txBody>
+      </p:sp>
+      <p:pic>
+        <p:nvPicPr>
+          <p:cNvPr id="1026" name="Picture 2" descr="example of a training pipeline on Vertex AI Pipelines using Kubeflow">
+            <a:extLst>
+              <a:ext uri="{FF2B5EF4-FFF2-40B4-BE49-F238E27FC236}">
+                <a16:creationId xmlns:a16="http://schemas.microsoft.com/office/drawing/2014/main" id="{7A9CBE5D-0ACE-EE69-D40F-1E4247C006C7}"/>
+              </a:ext>
+            </a:extLst>
+          </p:cNvPr>
+          <p:cNvPicPr>
+            <a:picLocks noChangeAspect="1" noChangeArrowheads="1"/>
+          </p:cNvPicPr>
+          <p:nvPr/>
+        </p:nvPicPr>
+        <p:blipFill>
+          <a:blip r:embed="rId2">
+            <a:extLst>
+              <a:ext uri="{28A0092B-C50C-407E-A947-70E740481C1C}">
+                <a14:useLocalDpi xmlns:a14="http://schemas.microsoft.com/office/drawing/2010/main" val="0"/>
+              </a:ext>
+            </a:extLst>
+          </a:blip>
+          <a:srcRect/>
+          <a:stretch>
+            <a:fillRect/>
+          </a:stretch>
+        </p:blipFill>
+        <p:spPr bwMode="auto">
+          <a:xfrm>
+            <a:off x="2650499" y="257175"/>
+            <a:ext cx="4057650" cy="6343650"/>
+          </a:xfrm>
+          <a:prstGeom prst="rect">
+            <a:avLst/>
+          </a:prstGeom>
+          <a:noFill/>
+          <a:extLst>
+            <a:ext uri="{909E8E84-426E-40DD-AFC4-6F175D3DCCD1}">
+              <a14:hiddenFill xmlns:a14="http://schemas.microsoft.com/office/drawing/2010/main">
+                <a:solidFill>
+                  <a:srgbClr val="FFFFFF"/>
+                </a:solidFill>
+              </a14:hiddenFill>
+            </a:ext>
+          </a:extLst>
+        </p:spPr>
+      </p:pic>
+    </p:spTree>
+    <p:extLst>
+      <p:ext uri="{BB962C8B-B14F-4D97-AF65-F5344CB8AC3E}">
+        <p14:creationId xmlns:p14="http://schemas.microsoft.com/office/powerpoint/2010/main" val="2919860233"/>
+      </p:ext>
+    </p:extLst>
+  </p:cSld>
+  <p:clrMapOvr>
+    <a:masterClrMapping/>
+  </p:clrMapOvr>
+</p:sld>
+</file>
+
+<file path=ppt/slides/slide11.xml><?xml version="1.0" encoding="utf-8"?>
+<p:sld xmlns:a="http://schemas.openxmlformats.org/drawingml/2006/main" xmlns:r="http://schemas.openxmlformats.org/officeDocument/2006/relationships" xmlns:p="http://schemas.openxmlformats.org/presentationml/2006/main">
+  <p:cSld>
+    <p:spTree>
+      <p:nvGrpSpPr>
+        <p:cNvPr id="1" name=""/>
+        <p:cNvGrpSpPr/>
+        <p:nvPr/>
+      </p:nvGrpSpPr>
+      <p:grpSpPr>
+        <a:xfrm>
+          <a:off x="0" y="0"/>
+          <a:ext cx="0" cy="0"/>
+          <a:chOff x="0" y="0"/>
+          <a:chExt cx="0" cy="0"/>
+        </a:xfrm>
+      </p:grpSpPr>
+      <p:sp>
+        <p:nvSpPr>
+          <p:cNvPr id="2" name="Title 1">
+            <a:extLst>
+              <a:ext uri="{FF2B5EF4-FFF2-40B4-BE49-F238E27FC236}">
+                <a16:creationId xmlns:a16="http://schemas.microsoft.com/office/drawing/2014/main" id="{7863E0BB-52CE-4652-8F0A-0D5DF7773AF2}"/>
+              </a:ext>
+            </a:extLst>
+          </p:cNvPr>
+          <p:cNvSpPr>
+            <a:spLocks noGrp="1"/>
+          </p:cNvSpPr>
+          <p:nvPr>
+            <p:ph type="title"/>
+          </p:nvPr>
+        </p:nvSpPr>
+        <p:spPr/>
+        <p:txBody>
+          <a:bodyPr/>
+          <a:lstStyle/>
+          <a:p>
+            <a:r>
+              <a:rPr lang="en-US"/>
+              <a:t>Vertex Ai</a:t>
+            </a:r>
+            <a:endParaRPr lang="en-US" dirty="0"/>
+          </a:p>
+        </p:txBody>
+      </p:sp>
+      <p:sp>
+        <p:nvSpPr>
+          <p:cNvPr id="3" name="Text Placeholder 2">
+            <a:extLst>
+              <a:ext uri="{FF2B5EF4-FFF2-40B4-BE49-F238E27FC236}">
+                <a16:creationId xmlns:a16="http://schemas.microsoft.com/office/drawing/2014/main" id="{4288697C-36CA-4301-AF82-974D9E51273D}"/>
+              </a:ext>
+            </a:extLst>
+          </p:cNvPr>
+          <p:cNvSpPr>
+            <a:spLocks noGrp="1"/>
+          </p:cNvSpPr>
+          <p:nvPr>
+            <p:ph type="body" idx="1"/>
+          </p:nvPr>
+        </p:nvSpPr>
+        <p:spPr/>
+        <p:txBody>
+          <a:bodyPr/>
+          <a:lstStyle/>
+          <a:p>
+            <a:r>
+              <a:rPr lang="en-CA"/>
+              <a:t>Hopefully Google doesn’t get bored of this one anytime soon</a:t>
+            </a:r>
+            <a:endParaRPr lang="en-US" dirty="0"/>
+          </a:p>
+        </p:txBody>
+      </p:sp>
+    </p:spTree>
+    <p:extLst>
+      <p:ext uri="{BB962C8B-B14F-4D97-AF65-F5344CB8AC3E}">
+        <p14:creationId xmlns:p14="http://schemas.microsoft.com/office/powerpoint/2010/main" val="2687529475"/>
+      </p:ext>
+    </p:extLst>
+  </p:cSld>
+  <p:clrMapOvr>
+    <a:masterClrMapping/>
+  </p:clrMapOvr>
+</p:sld>
+</file>
+
+<file path=ppt/slides/slide12.xml><?xml version="1.0" encoding="utf-8"?>
+<p:sld xmlns:a="http://schemas.openxmlformats.org/drawingml/2006/main" xmlns:r="http://schemas.openxmlformats.org/officeDocument/2006/relationships" xmlns:p="http://schemas.openxmlformats.org/presentationml/2006/main">
+  <p:cSld>
+    <p:spTree>
+      <p:nvGrpSpPr>
+        <p:cNvPr id="1" name=""/>
+        <p:cNvGrpSpPr/>
+        <p:nvPr/>
+      </p:nvGrpSpPr>
+      <p:grpSpPr>
+        <a:xfrm>
+          <a:off x="0" y="0"/>
+          <a:ext cx="0" cy="0"/>
+          <a:chOff x="0" y="0"/>
+          <a:chExt cx="0" cy="0"/>
+        </a:xfrm>
+      </p:grpSpPr>
+      <p:sp>
+        <p:nvSpPr>
+          <p:cNvPr id="9" name="Title 8">
+            <a:extLst>
+              <a:ext uri="{FF2B5EF4-FFF2-40B4-BE49-F238E27FC236}">
+                <a16:creationId xmlns:a16="http://schemas.microsoft.com/office/drawing/2014/main" id="{6B6ECF17-AC73-A854-6E16-98A083AFB5CB}"/>
+              </a:ext>
+            </a:extLst>
+          </p:cNvPr>
+          <p:cNvSpPr>
+            <a:spLocks noGrp="1"/>
+          </p:cNvSpPr>
+          <p:nvPr>
+            <p:ph type="title"/>
+          </p:nvPr>
+        </p:nvSpPr>
+        <p:spPr>
+          <a:xfrm>
+            <a:off x="8477250" y="603504"/>
+            <a:ext cx="3144774" cy="524905"/>
+          </a:xfrm>
+        </p:spPr>
+        <p:txBody>
+          <a:bodyPr/>
+          <a:lstStyle/>
+          <a:p>
+            <a:r>
+              <a:rPr lang="en-US" sz="2400"/>
+              <a:t>What is Vertex AI?</a:t>
+            </a:r>
+            <a:endParaRPr lang="en-US" sz="2400" dirty="0"/>
+          </a:p>
+        </p:txBody>
+      </p:sp>
+      <p:sp>
+        <p:nvSpPr>
+          <p:cNvPr id="12" name="TextBox 11">
+            <a:extLst>
+              <a:ext uri="{FF2B5EF4-FFF2-40B4-BE49-F238E27FC236}">
+                <a16:creationId xmlns:a16="http://schemas.microsoft.com/office/drawing/2014/main" id="{3507AAD7-6C14-7076-9044-4801CCD4C7EF}"/>
+              </a:ext>
+            </a:extLst>
+          </p:cNvPr>
+          <p:cNvSpPr txBox="1"/>
+          <p:nvPr/>
+        </p:nvSpPr>
+        <p:spPr>
+          <a:xfrm>
+            <a:off x="8385244" y="1495425"/>
+            <a:ext cx="3322506" cy="3970318"/>
+          </a:xfrm>
+          <a:prstGeom prst="rect">
+            <a:avLst/>
+          </a:prstGeom>
+          <a:noFill/>
+        </p:spPr>
+        <p:txBody>
+          <a:bodyPr wrap="square" rtlCol="0">
+            <a:spAutoFit/>
+          </a:bodyPr>
+          <a:lstStyle/>
+          <a:p>
+            <a:pPr marL="285750" indent="-285750">
+              <a:buFont typeface="Arial" panose="020B0604020202020204" pitchFamily="34" charset="0"/>
+              <a:buChar char="•"/>
+            </a:pPr>
+            <a:r>
+              <a:rPr lang="en-US" sz="1400"/>
+              <a:t>Vertex AI is simply an umbrella marketing term for a variety of independent Data/AI-focused GCP services, some new and some old.</a:t>
+            </a:r>
+          </a:p>
+          <a:p>
+            <a:pPr marL="742950" lvl="1" indent="-285750">
+              <a:buFont typeface="Arial" panose="020B0604020202020204" pitchFamily="34" charset="0"/>
+              <a:buChar char="•"/>
+            </a:pPr>
+            <a:r>
+              <a:rPr lang="en-US" sz="1400"/>
+              <a:t>The term “Vertex” doesn’t actually appear in any of the Google Cloud APIs, SDK commands, or Terraform modules, except in docstrings!</a:t>
+            </a:r>
+          </a:p>
+          <a:p>
+            <a:pPr marL="285750" indent="-285750">
+              <a:buFont typeface="Arial" panose="020B0604020202020204" pitchFamily="34" charset="0"/>
+              <a:buChar char="•"/>
+            </a:pPr>
+            <a:r>
+              <a:rPr lang="en-US" sz="1400"/>
+              <a:t>The goal is clearly to unify and highlight synergies between GCP services on the entire “Data⇒Value” journey, to incentivize developers away from more easily-portable “Kubeflow-on-GKE” designs.</a:t>
+            </a:r>
+            <a:endParaRPr lang="en-US" sz="1400" dirty="0"/>
+          </a:p>
+        </p:txBody>
+      </p:sp>
+      <p:pic>
+        <p:nvPicPr>
+          <p:cNvPr id="2" name="Picture 1" descr="Graphical user interface&#10;&#10;Description automatically generated">
+            <a:extLst>
+              <a:ext uri="{FF2B5EF4-FFF2-40B4-BE49-F238E27FC236}">
+                <a16:creationId xmlns:a16="http://schemas.microsoft.com/office/drawing/2014/main" id="{09B0CEB7-1772-A7A5-C63B-825DE241A9EF}"/>
+              </a:ext>
+            </a:extLst>
+          </p:cNvPr>
+          <p:cNvPicPr>
+            <a:picLocks noChangeAspect="1"/>
+          </p:cNvPicPr>
+          <p:nvPr/>
+        </p:nvPicPr>
+        <p:blipFill>
+          <a:blip r:embed="rId2">
+            <a:extLst>
+              <a:ext uri="{28A0092B-C50C-407E-A947-70E740481C1C}">
+                <a14:useLocalDpi xmlns:a14="http://schemas.microsoft.com/office/drawing/2010/main" val="0"/>
+              </a:ext>
+            </a:extLst>
+          </a:blip>
+          <a:stretch>
+            <a:fillRect/>
+          </a:stretch>
+        </p:blipFill>
+        <p:spPr>
+          <a:xfrm>
+            <a:off x="409848" y="1884532"/>
+            <a:ext cx="7198377" cy="3329494"/>
+          </a:xfrm>
+          <a:prstGeom prst="rect">
+            <a:avLst/>
+          </a:prstGeom>
+        </p:spPr>
+      </p:pic>
+    </p:spTree>
+    <p:extLst>
+      <p:ext uri="{BB962C8B-B14F-4D97-AF65-F5344CB8AC3E}">
+        <p14:creationId xmlns:p14="http://schemas.microsoft.com/office/powerpoint/2010/main" val="4274386115"/>
+      </p:ext>
+    </p:extLst>
+  </p:cSld>
+  <p:clrMapOvr>
+    <a:masterClrMapping/>
+  </p:clrMapOvr>
+</p:sld>
+</file>
+
+<file path=ppt/slides/slide13.xml><?xml version="1.0" encoding="utf-8"?>
+<p:sld xmlns:a="http://schemas.openxmlformats.org/drawingml/2006/main" xmlns:r="http://schemas.openxmlformats.org/officeDocument/2006/relationships" xmlns:p="http://schemas.openxmlformats.org/presentationml/2006/main">
+  <p:cSld>
+    <p:spTree>
+      <p:nvGrpSpPr>
+        <p:cNvPr id="1" name=""/>
+        <p:cNvGrpSpPr/>
+        <p:nvPr/>
+      </p:nvGrpSpPr>
+      <p:grpSpPr>
+        <a:xfrm>
+          <a:off x="0" y="0"/>
+          <a:ext cx="0" cy="0"/>
+          <a:chOff x="0" y="0"/>
+          <a:chExt cx="0" cy="0"/>
+        </a:xfrm>
+      </p:grpSpPr>
+      <p:sp>
+        <p:nvSpPr>
+          <p:cNvPr id="15" name="Arrow: Circular 14">
+            <a:extLst>
+              <a:ext uri="{FF2B5EF4-FFF2-40B4-BE49-F238E27FC236}">
+                <a16:creationId xmlns:a16="http://schemas.microsoft.com/office/drawing/2014/main" id="{45DEA589-C81D-703A-B683-859BE2C8AEAC}"/>
+              </a:ext>
+            </a:extLst>
+          </p:cNvPr>
+          <p:cNvSpPr/>
+          <p:nvPr/>
+        </p:nvSpPr>
+        <p:spPr>
+          <a:xfrm>
+            <a:off x="340468" y="1506330"/>
+            <a:ext cx="7684851" cy="4310809"/>
+          </a:xfrm>
+          <a:prstGeom prst="circularArrow">
+            <a:avLst>
+              <a:gd name="adj1" fmla="val 6445"/>
+              <a:gd name="adj2" fmla="val 704844"/>
+              <a:gd name="adj3" fmla="val 20095681"/>
+              <a:gd name="adj4" fmla="val 814020"/>
+              <a:gd name="adj5" fmla="val 10269"/>
+            </a:avLst>
+          </a:prstGeom>
+          <a:solidFill>
+            <a:schemeClr val="accent2">
+              <a:lumMod val="40000"/>
+              <a:lumOff val="60000"/>
+            </a:schemeClr>
+          </a:solidFill>
+          <a:ln>
+            <a:solidFill>
+              <a:schemeClr val="accent2">
+                <a:lumMod val="75000"/>
+              </a:schemeClr>
+            </a:solidFill>
+          </a:ln>
+          <a:effectLst>
+            <a:outerShdw blurRad="50800" dist="38100" dir="5400000" algn="t" rotWithShape="0">
+              <a:prstClr val="black">
+                <a:alpha val="40000"/>
+              </a:prstClr>
+            </a:outerShdw>
+          </a:effectLst>
+        </p:spPr>
+        <p:style>
+          <a:lnRef idx="2">
+            <a:schemeClr val="accent1">
+              <a:shade val="50000"/>
+            </a:schemeClr>
+          </a:lnRef>
+          <a:fillRef idx="1">
+            <a:schemeClr val="accent1"/>
+          </a:fillRef>
+          <a:effectRef idx="0">
+            <a:schemeClr val="accent1"/>
+          </a:effectRef>
+          <a:fontRef idx="minor">
+            <a:schemeClr val="lt1"/>
+          </a:fontRef>
+        </p:style>
+        <p:txBody>
+          <a:bodyPr rtlCol="0" anchor="t"/>
+          <a:lstStyle/>
+          <a:p>
+            <a:pPr algn="ctr"/>
+            <a:endParaRPr lang="en-CA">
+              <a:solidFill>
+                <a:schemeClr val="tx1"/>
+              </a:solidFill>
+            </a:endParaRPr>
+          </a:p>
+        </p:txBody>
+      </p:sp>
+      <p:sp>
+        <p:nvSpPr>
+          <p:cNvPr id="9" name="Title 8">
+            <a:extLst>
+              <a:ext uri="{FF2B5EF4-FFF2-40B4-BE49-F238E27FC236}">
+                <a16:creationId xmlns:a16="http://schemas.microsoft.com/office/drawing/2014/main" id="{6B6ECF17-AC73-A854-6E16-98A083AFB5CB}"/>
+              </a:ext>
+            </a:extLst>
+          </p:cNvPr>
+          <p:cNvSpPr>
+            <a:spLocks noGrp="1"/>
+          </p:cNvSpPr>
+          <p:nvPr>
+            <p:ph type="title"/>
+          </p:nvPr>
+        </p:nvSpPr>
+        <p:spPr>
+          <a:xfrm>
+            <a:off x="8477250" y="603504"/>
+            <a:ext cx="3144774" cy="524905"/>
+          </a:xfrm>
+        </p:spPr>
+        <p:txBody>
+          <a:bodyPr/>
+          <a:lstStyle/>
+          <a:p>
+            <a:r>
+              <a:rPr lang="en-US" sz="2400"/>
+              <a:t>Machine Learning Lifecycle</a:t>
+            </a:r>
+            <a:endParaRPr lang="en-US" sz="2400" dirty="0"/>
+          </a:p>
+        </p:txBody>
+      </p:sp>
+      <p:sp>
+        <p:nvSpPr>
+          <p:cNvPr id="12" name="TextBox 11">
+            <a:extLst>
+              <a:ext uri="{FF2B5EF4-FFF2-40B4-BE49-F238E27FC236}">
+                <a16:creationId xmlns:a16="http://schemas.microsoft.com/office/drawing/2014/main" id="{3507AAD7-6C14-7076-9044-4801CCD4C7EF}"/>
+              </a:ext>
+            </a:extLst>
+          </p:cNvPr>
+          <p:cNvSpPr txBox="1"/>
+          <p:nvPr/>
+        </p:nvSpPr>
+        <p:spPr>
+          <a:xfrm>
+            <a:off x="8562975" y="1495425"/>
+            <a:ext cx="3144774" cy="2031325"/>
+          </a:xfrm>
+          <a:prstGeom prst="rect">
+            <a:avLst/>
+          </a:prstGeom>
+          <a:noFill/>
+        </p:spPr>
+        <p:txBody>
+          <a:bodyPr wrap="square" rtlCol="0">
+            <a:spAutoFit/>
+          </a:bodyPr>
+          <a:lstStyle/>
+          <a:p>
+            <a:r>
+              <a:rPr lang="en-US"/>
+              <a:t>Unlike traditional software systems that operate deterministically according to requirements and algorithms that are determined </a:t>
+            </a:r>
+            <a:endParaRPr lang="en-CA"/>
+          </a:p>
+        </p:txBody>
+      </p:sp>
+      <p:sp>
+        <p:nvSpPr>
+          <p:cNvPr id="19" name="TextBox 18">
+            <a:extLst>
+              <a:ext uri="{FF2B5EF4-FFF2-40B4-BE49-F238E27FC236}">
+                <a16:creationId xmlns:a16="http://schemas.microsoft.com/office/drawing/2014/main" id="{653D03A6-9A32-052E-30DC-DE8EB5C71DEF}"/>
+              </a:ext>
+            </a:extLst>
+          </p:cNvPr>
+          <p:cNvSpPr txBox="1"/>
+          <p:nvPr/>
+        </p:nvSpPr>
+        <p:spPr>
+          <a:xfrm>
+            <a:off x="5777418" y="5281077"/>
+            <a:ext cx="2247900" cy="369332"/>
+          </a:xfrm>
+          <a:prstGeom prst="rect">
+            <a:avLst/>
+          </a:prstGeom>
+          <a:noFill/>
+        </p:spPr>
+        <p:txBody>
+          <a:bodyPr wrap="square" rtlCol="0">
+            <a:spAutoFit/>
+          </a:bodyPr>
+          <a:lstStyle/>
+          <a:p>
+            <a:pPr algn="r"/>
+            <a:r>
+              <a:rPr lang="en-US"/>
+              <a:t>Feature Extraction</a:t>
+            </a:r>
+            <a:endParaRPr lang="en-CA"/>
+          </a:p>
+        </p:txBody>
+      </p:sp>
+      <p:sp>
+        <p:nvSpPr>
+          <p:cNvPr id="20" name="TextBox 19">
+            <a:extLst>
+              <a:ext uri="{FF2B5EF4-FFF2-40B4-BE49-F238E27FC236}">
+                <a16:creationId xmlns:a16="http://schemas.microsoft.com/office/drawing/2014/main" id="{1AA3310C-2580-E03B-B074-B51AA6D93A83}"/>
+              </a:ext>
+            </a:extLst>
+          </p:cNvPr>
+          <p:cNvSpPr txBox="1"/>
+          <p:nvPr/>
+        </p:nvSpPr>
+        <p:spPr>
+          <a:xfrm>
+            <a:off x="212791" y="5270171"/>
+            <a:ext cx="2247900" cy="369332"/>
+          </a:xfrm>
+          <a:prstGeom prst="rect">
+            <a:avLst/>
+          </a:prstGeom>
+          <a:noFill/>
+        </p:spPr>
+        <p:txBody>
+          <a:bodyPr wrap="square" rtlCol="0">
+            <a:spAutoFit/>
+          </a:bodyPr>
+          <a:lstStyle/>
+          <a:p>
+            <a:pPr algn="ctr"/>
+            <a:r>
+              <a:rPr lang="en-US"/>
+              <a:t>Training</a:t>
+            </a:r>
+            <a:endParaRPr lang="en-CA"/>
+          </a:p>
+        </p:txBody>
+      </p:sp>
+      <p:sp>
+        <p:nvSpPr>
+          <p:cNvPr id="21" name="TextBox 20">
+            <a:extLst>
+              <a:ext uri="{FF2B5EF4-FFF2-40B4-BE49-F238E27FC236}">
+                <a16:creationId xmlns:a16="http://schemas.microsoft.com/office/drawing/2014/main" id="{2B327E6D-FB04-0B20-D2B9-D2D5C5C3B8EB}"/>
+              </a:ext>
+            </a:extLst>
+          </p:cNvPr>
+          <p:cNvSpPr txBox="1"/>
+          <p:nvPr/>
+        </p:nvSpPr>
+        <p:spPr>
+          <a:xfrm>
+            <a:off x="910345" y="1506330"/>
+            <a:ext cx="2247900" cy="369332"/>
+          </a:xfrm>
+          <a:prstGeom prst="rect">
+            <a:avLst/>
+          </a:prstGeom>
+          <a:noFill/>
+        </p:spPr>
+        <p:txBody>
+          <a:bodyPr wrap="square" rtlCol="0">
+            <a:spAutoFit/>
+          </a:bodyPr>
+          <a:lstStyle/>
+          <a:p>
+            <a:pPr algn="ctr"/>
+            <a:r>
+              <a:rPr lang="en-US"/>
+              <a:t>Inference</a:t>
+            </a:r>
+            <a:endParaRPr lang="en-CA"/>
+          </a:p>
+        </p:txBody>
+      </p:sp>
+      <p:sp>
+        <p:nvSpPr>
+          <p:cNvPr id="22" name="TextBox 21">
+            <a:extLst>
+              <a:ext uri="{FF2B5EF4-FFF2-40B4-BE49-F238E27FC236}">
+                <a16:creationId xmlns:a16="http://schemas.microsoft.com/office/drawing/2014/main" id="{4B129865-3C69-96A0-92F6-AAA72780AA01}"/>
+              </a:ext>
+            </a:extLst>
+          </p:cNvPr>
+          <p:cNvSpPr txBox="1"/>
+          <p:nvPr/>
+        </p:nvSpPr>
+        <p:spPr>
+          <a:xfrm>
+            <a:off x="5320827" y="1589334"/>
+            <a:ext cx="2247900" cy="369332"/>
+          </a:xfrm>
+          <a:prstGeom prst="rect">
+            <a:avLst/>
+          </a:prstGeom>
+          <a:noFill/>
+        </p:spPr>
+        <p:txBody>
+          <a:bodyPr wrap="square" rtlCol="0">
+            <a:spAutoFit/>
+          </a:bodyPr>
+          <a:lstStyle/>
+          <a:p>
+            <a:pPr algn="ctr"/>
+            <a:r>
+              <a:rPr lang="en-US"/>
+              <a:t>Monitoring</a:t>
+            </a:r>
+            <a:endParaRPr lang="en-CA"/>
+          </a:p>
+        </p:txBody>
+      </p:sp>
+      <p:pic>
+        <p:nvPicPr>
+          <p:cNvPr id="13" name="Graphic 12">
+            <a:extLst>
+              <a:ext uri="{FF2B5EF4-FFF2-40B4-BE49-F238E27FC236}">
+                <a16:creationId xmlns:a16="http://schemas.microsoft.com/office/drawing/2014/main" id="{777B50D0-C8A6-3017-D2F9-5E119B968490}"/>
+              </a:ext>
+            </a:extLst>
+          </p:cNvPr>
+          <p:cNvPicPr>
+            <a:picLocks noChangeAspect="1"/>
+          </p:cNvPicPr>
+          <p:nvPr/>
+        </p:nvPicPr>
+        <p:blipFill>
+          <a:blip r:embed="rId2">
+            <a:extLst>
+              <a:ext uri="{96DAC541-7B7A-43D3-8B79-37D633B846F1}">
+                <asvg:svgBlip xmlns:asvg="http://schemas.microsoft.com/office/drawing/2016/SVG/main" r:embed="rId3"/>
+              </a:ext>
+            </a:extLst>
+          </a:blip>
+          <a:stretch>
+            <a:fillRect/>
+          </a:stretch>
+        </p:blipFill>
+        <p:spPr>
+          <a:xfrm>
+            <a:off x="6608524" y="3005117"/>
+            <a:ext cx="1313234" cy="1313234"/>
+          </a:xfrm>
+          <a:prstGeom prst="rect">
+            <a:avLst/>
+          </a:prstGeom>
+        </p:spPr>
+      </p:pic>
+      <p:pic>
+        <p:nvPicPr>
+          <p:cNvPr id="1032" name="Picture 8" descr="Google Cloud AutoML">
+            <a:extLst>
+              <a:ext uri="{FF2B5EF4-FFF2-40B4-BE49-F238E27FC236}">
+                <a16:creationId xmlns:a16="http://schemas.microsoft.com/office/drawing/2014/main" id="{91709BD1-52B8-94C1-CFB4-AD642321EC62}"/>
+              </a:ext>
+            </a:extLst>
+          </p:cNvPr>
+          <p:cNvPicPr>
+            <a:picLocks noChangeAspect="1" noChangeArrowheads="1"/>
+          </p:cNvPicPr>
+          <p:nvPr/>
+        </p:nvPicPr>
+        <p:blipFill>
+          <a:blip r:embed="rId4">
+            <a:extLst>
+              <a:ext uri="{28A0092B-C50C-407E-A947-70E740481C1C}">
+                <a14:useLocalDpi xmlns:a14="http://schemas.microsoft.com/office/drawing/2010/main" val="0"/>
+              </a:ext>
+            </a:extLst>
+          </a:blip>
+          <a:srcRect/>
+          <a:stretch>
+            <a:fillRect/>
+          </a:stretch>
+        </p:blipFill>
+        <p:spPr bwMode="auto">
+          <a:xfrm>
+            <a:off x="3158245" y="4157399"/>
+            <a:ext cx="1194271" cy="1194271"/>
+          </a:xfrm>
+          <a:prstGeom prst="rect">
+            <a:avLst/>
+          </a:prstGeom>
+          <a:noFill/>
+          <a:extLst>
+            <a:ext uri="{909E8E84-426E-40DD-AFC4-6F175D3DCCD1}">
+              <a14:hiddenFill xmlns:a14="http://schemas.microsoft.com/office/drawing/2010/main">
+                <a:solidFill>
+                  <a:srgbClr val="FFFFFF"/>
+                </a:solidFill>
+              </a14:hiddenFill>
+            </a:ext>
+          </a:extLst>
+        </p:spPr>
+      </p:pic>
+      <p:pic>
+        <p:nvPicPr>
+          <p:cNvPr id="1034" name="Picture 10" descr="Python Logo transparent PNG - StickPNG">
+            <a:extLst>
+              <a:ext uri="{FF2B5EF4-FFF2-40B4-BE49-F238E27FC236}">
+                <a16:creationId xmlns:a16="http://schemas.microsoft.com/office/drawing/2014/main" id="{482A3B94-1E53-6AD4-3A3B-21A725979521}"/>
+              </a:ext>
+            </a:extLst>
+          </p:cNvPr>
+          <p:cNvPicPr>
+            <a:picLocks noChangeAspect="1" noChangeArrowheads="1"/>
+          </p:cNvPicPr>
+          <p:nvPr/>
+        </p:nvPicPr>
+        <p:blipFill>
+          <a:blip r:embed="rId5">
+            <a:extLst>
+              <a:ext uri="{28A0092B-C50C-407E-A947-70E740481C1C}">
+                <a14:useLocalDpi xmlns:a14="http://schemas.microsoft.com/office/drawing/2010/main" val="0"/>
+              </a:ext>
+            </a:extLst>
+          </a:blip>
+          <a:srcRect/>
+          <a:stretch>
+            <a:fillRect/>
+          </a:stretch>
+        </p:blipFill>
+        <p:spPr bwMode="auto">
+          <a:xfrm>
+            <a:off x="4117303" y="5281077"/>
+            <a:ext cx="1203524" cy="1198841"/>
+          </a:xfrm>
+          <a:prstGeom prst="rect">
+            <a:avLst/>
+          </a:prstGeom>
+          <a:noFill/>
+          <a:extLst>
+            <a:ext uri="{909E8E84-426E-40DD-AFC4-6F175D3DCCD1}">
+              <a14:hiddenFill xmlns:a14="http://schemas.microsoft.com/office/drawing/2010/main">
+                <a:solidFill>
+                  <a:srgbClr val="FFFFFF"/>
+                </a:solidFill>
+              </a14:hiddenFill>
+            </a:ext>
+          </a:extLst>
+        </p:spPr>
+      </p:pic>
+      <p:sp>
+        <p:nvSpPr>
+          <p:cNvPr id="23" name="Rectangle 22">
+            <a:extLst>
+              <a:ext uri="{FF2B5EF4-FFF2-40B4-BE49-F238E27FC236}">
+                <a16:creationId xmlns:a16="http://schemas.microsoft.com/office/drawing/2014/main" id="{7085C738-CED9-D6D6-5CFA-1ACC5D524633}"/>
+              </a:ext>
+            </a:extLst>
+          </p:cNvPr>
+          <p:cNvSpPr/>
+          <p:nvPr/>
+        </p:nvSpPr>
+        <p:spPr>
+          <a:xfrm rot="20293634">
+            <a:off x="2825487" y="5223348"/>
+            <a:ext cx="2860776" cy="199098"/>
+          </a:xfrm>
+          <a:prstGeom prst="rect">
+            <a:avLst/>
+          </a:prstGeom>
+          <a:scene3d>
+            <a:camera prst="isometricOffAxis1Top"/>
+            <a:lightRig rig="threePt" dir="t"/>
+          </a:scene3d>
+        </p:spPr>
+        <p:style>
+          <a:lnRef idx="3">
+            <a:schemeClr val="lt1"/>
+          </a:lnRef>
+          <a:fillRef idx="1">
+            <a:schemeClr val="accent3"/>
+          </a:fillRef>
+          <a:effectRef idx="1">
+            <a:schemeClr val="accent3"/>
+          </a:effectRef>
+          <a:fontRef idx="minor">
+            <a:schemeClr val="lt1"/>
+          </a:fontRef>
+        </p:style>
+        <p:txBody>
+          <a:bodyPr rtlCol="0" anchor="ctr"/>
+          <a:lstStyle/>
+          <a:p>
+            <a:pPr algn="ctr"/>
+            <a:endParaRPr lang="en-CA"/>
+          </a:p>
+        </p:txBody>
+      </p:sp>
+      <p:pic>
+        <p:nvPicPr>
+          <p:cNvPr id="1038" name="Picture 14" descr="Imaginary Cloud: Web, Mobile, UI/UX Design &amp; AI Development">
+            <a:extLst>
+              <a:ext uri="{FF2B5EF4-FFF2-40B4-BE49-F238E27FC236}">
+                <a16:creationId xmlns:a16="http://schemas.microsoft.com/office/drawing/2014/main" id="{D91DC787-BFD6-39F6-84F8-E6044471A328}"/>
+              </a:ext>
+            </a:extLst>
+          </p:cNvPr>
+          <p:cNvPicPr>
+            <a:picLocks noChangeAspect="1" noChangeArrowheads="1"/>
+          </p:cNvPicPr>
+          <p:nvPr/>
+        </p:nvPicPr>
+        <p:blipFill>
+          <a:blip r:embed="rId6">
+            <a:extLst>
+              <a:ext uri="{28A0092B-C50C-407E-A947-70E740481C1C}">
+                <a14:useLocalDpi xmlns:a14="http://schemas.microsoft.com/office/drawing/2010/main" val="0"/>
+              </a:ext>
+            </a:extLst>
+          </a:blip>
+          <a:srcRect/>
+          <a:stretch>
+            <a:fillRect/>
+          </a:stretch>
+        </p:blipFill>
+        <p:spPr bwMode="auto">
+          <a:xfrm>
+            <a:off x="284214" y="2831864"/>
+            <a:ext cx="1052527" cy="1194271"/>
+          </a:xfrm>
+          <a:prstGeom prst="rect">
+            <a:avLst/>
+          </a:prstGeom>
+          <a:noFill/>
+          <a:extLst>
+            <a:ext uri="{909E8E84-426E-40DD-AFC4-6F175D3DCCD1}">
+              <a14:hiddenFill xmlns:a14="http://schemas.microsoft.com/office/drawing/2010/main">
+                <a:solidFill>
+                  <a:srgbClr val="FFFFFF"/>
+                </a:solidFill>
+              </a14:hiddenFill>
+            </a:ext>
+          </a:extLst>
+        </p:spPr>
+      </p:pic>
+      <p:pic>
+        <p:nvPicPr>
+          <p:cNvPr id="1040" name="Picture 16">
+            <a:extLst>
+              <a:ext uri="{FF2B5EF4-FFF2-40B4-BE49-F238E27FC236}">
+                <a16:creationId xmlns:a16="http://schemas.microsoft.com/office/drawing/2014/main" id="{EFF4432E-0572-355C-EB7A-83E2753903E1}"/>
+              </a:ext>
+            </a:extLst>
+          </p:cNvPr>
+          <p:cNvPicPr>
+            <a:picLocks noChangeAspect="1" noChangeArrowheads="1"/>
+          </p:cNvPicPr>
+          <p:nvPr/>
+        </p:nvPicPr>
+        <p:blipFill>
+          <a:blip r:embed="rId7">
+            <a:extLst>
+              <a:ext uri="{28A0092B-C50C-407E-A947-70E740481C1C}">
+                <a14:useLocalDpi xmlns:a14="http://schemas.microsoft.com/office/drawing/2010/main" val="0"/>
+              </a:ext>
+            </a:extLst>
+          </a:blip>
+          <a:srcRect/>
+          <a:stretch>
+            <a:fillRect/>
+          </a:stretch>
+        </p:blipFill>
+        <p:spPr bwMode="auto">
+          <a:xfrm>
+            <a:off x="3072927" y="705812"/>
+            <a:ext cx="2247900" cy="1168440"/>
+          </a:xfrm>
+          <a:prstGeom prst="rect">
+            <a:avLst/>
+          </a:prstGeom>
+          <a:noFill/>
+          <a:extLst>
+            <a:ext uri="{909E8E84-426E-40DD-AFC4-6F175D3DCCD1}">
+              <a14:hiddenFill xmlns:a14="http://schemas.microsoft.com/office/drawing/2010/main">
+                <a:solidFill>
+                  <a:srgbClr val="FFFFFF"/>
+                </a:solidFill>
+              </a14:hiddenFill>
+            </a:ext>
+          </a:extLst>
+        </p:spPr>
+      </p:pic>
+    </p:spTree>
+    <p:extLst>
+      <p:ext uri="{BB962C8B-B14F-4D97-AF65-F5344CB8AC3E}">
+        <p14:creationId xmlns:p14="http://schemas.microsoft.com/office/powerpoint/2010/main" val="672058878"/>
+      </p:ext>
+    </p:extLst>
+  </p:cSld>
+  <p:clrMapOvr>
+    <a:masterClrMapping/>
+  </p:clrMapOvr>
+</p:sld>
+</file>
+
 <file path=ppt/slides/slide2.xml><?xml version="1.0" encoding="utf-8"?>
 <p:sld xmlns:a="http://schemas.openxmlformats.org/drawingml/2006/main" xmlns:r="http://schemas.openxmlformats.org/officeDocument/2006/relationships" xmlns:p="http://schemas.openxmlformats.org/presentationml/2006/main">
   <p:cSld>
@@ -7601,8 +8659,8 @@
         </p:nvSpPr>
         <p:spPr>
           <a:xfrm>
-            <a:off x="5777418" y="5281077"/>
-            <a:ext cx="2247900" cy="369332"/>
+            <a:off x="5198616" y="5268666"/>
+            <a:ext cx="2854189" cy="646331"/>
           </a:xfrm>
           <a:prstGeom prst="rect">
             <a:avLst/>
@@ -7617,10 +8675,17 @@
           <a:p>
             <a:pPr algn="r"/>
             <a:r>
-              <a:rPr lang="en-US"/>
+              <a:rPr lang="en-US" dirty="0"/>
+              <a:t>Data Transformation/</a:t>
+            </a:r>
+          </a:p>
+          <a:p>
+            <a:pPr algn="r"/>
+            <a:r>
+              <a:rPr lang="en-US" dirty="0"/>
               <a:t>Feature Extraction</a:t>
             </a:r>
-            <a:endParaRPr lang="en-CA"/>
+            <a:endParaRPr lang="en-CA" dirty="0"/>
           </a:p>
         </p:txBody>
       </p:sp>
@@ -7767,10 +8832,10 @@
       </p:grpSpPr>
       <p:sp>
         <p:nvSpPr>
-          <p:cNvPr id="3" name="Title 2">
+          <p:cNvPr id="9" name="Title 8">
             <a:extLst>
               <a:ext uri="{FF2B5EF4-FFF2-40B4-BE49-F238E27FC236}">
-                <a16:creationId xmlns:a16="http://schemas.microsoft.com/office/drawing/2014/main" id="{EFA3375E-EB34-3EDA-E006-5839B92AF9CB}"/>
+                <a16:creationId xmlns:a16="http://schemas.microsoft.com/office/drawing/2014/main" id="{6B6ECF17-AC73-A854-6E16-98A083AFB5CB}"/>
               </a:ext>
             </a:extLst>
           </p:cNvPr>
@@ -7784,7 +8849,7 @@
         <p:spPr>
           <a:xfrm>
             <a:off x="8477250" y="603504"/>
-            <a:ext cx="3144774" cy="549155"/>
+            <a:ext cx="3144774" cy="836549"/>
           </a:xfrm>
         </p:spPr>
         <p:txBody>
@@ -7792,37 +8857,37 @@
           <a:lstStyle/>
           <a:p>
             <a:r>
-              <a:rPr lang="en-CA"/>
-              <a:t>ML Pipelines </a:t>
-            </a:r>
-          </a:p>
-        </p:txBody>
-      </p:sp>
-      <p:sp>
-        <p:nvSpPr>
-          <p:cNvPr id="4" name="Text Placeholder 3">
+              <a:rPr lang="en-US" sz="2400" dirty="0"/>
+              <a:t>Data Transformation</a:t>
+            </a:r>
+          </a:p>
+        </p:txBody>
+      </p:sp>
+      <p:sp>
+        <p:nvSpPr>
+          <p:cNvPr id="12" name="TextBox 11">
             <a:extLst>
               <a:ext uri="{FF2B5EF4-FFF2-40B4-BE49-F238E27FC236}">
-                <a16:creationId xmlns:a16="http://schemas.microsoft.com/office/drawing/2014/main" id="{CF738055-F1B2-21E0-49D2-EB8C466E9C05}"/>
+                <a16:creationId xmlns:a16="http://schemas.microsoft.com/office/drawing/2014/main" id="{3507AAD7-6C14-7076-9044-4801CCD4C7EF}"/>
               </a:ext>
             </a:extLst>
           </p:cNvPr>
-          <p:cNvSpPr>
-            <a:spLocks noGrp="1"/>
-          </p:cNvSpPr>
-          <p:nvPr>
-            <p:ph type="body" sz="half" idx="2"/>
-          </p:nvPr>
+          <p:cNvSpPr txBox="1"/>
+          <p:nvPr/>
         </p:nvSpPr>
         <p:spPr>
           <a:xfrm>
-            <a:off x="8287555" y="1152659"/>
-            <a:ext cx="3438659" cy="5286778"/>
-          </a:xfrm>
-        </p:spPr>
-        <p:txBody>
-          <a:bodyPr>
-            <a:normAutofit/>
+            <a:off x="8477250" y="1724628"/>
+            <a:ext cx="3230499" cy="3693319"/>
+          </a:xfrm>
+          <a:prstGeom prst="rect">
+            <a:avLst/>
+          </a:prstGeom>
+          <a:noFill/>
+        </p:spPr>
+        <p:txBody>
+          <a:bodyPr wrap="square" rtlCol="0">
+            <a:spAutoFit/>
           </a:bodyPr>
           <a:lstStyle/>
           <a:p>
@@ -7831,16 +8896,8 @@
               <a:buChar char="•"/>
             </a:pPr>
             <a:r>
-              <a:rPr lang="en-CA" sz="1500"/>
-              <a:t>Every stage in an ML pipeline produces some sort of </a:t>
-            </a:r>
-            <a:r>
-              <a:rPr lang="en-CA" sz="1500" b="1"/>
-              <a:t>artifact</a:t>
-            </a:r>
-            <a:r>
-              <a:rPr lang="en-CA" sz="1500"/>
-              <a:t>, whether that artifact is data/metadata, a model, a forecast, etc.</a:t>
+              <a:rPr lang="en-CA" dirty="0"/>
+              <a:t>This stage has a lot in common with traditional ETL pipelines, and long predates AI/ML.</a:t>
             </a:r>
           </a:p>
           <a:p>
@@ -7849,61 +8906,28 @@
               <a:buChar char="•"/>
             </a:pPr>
             <a:r>
-              <a:rPr lang="en-CA" sz="1500"/>
-              <a:t>Ideally, these artifacts should have some combination of the following properties:</a:t>
-            </a:r>
-          </a:p>
-          <a:p>
-            <a:pPr marL="742950" lvl="1" indent="-285750">
+              <a:rPr lang="en-CA" dirty="0"/>
+              <a:t>Data sets for ML are often unusually large and unstructured, making them a particularly good fit for distributed algorithms.</a:t>
+            </a:r>
+          </a:p>
+          <a:p>
+            <a:pPr marL="285750" indent="-285750">
               <a:buFont typeface="Arial" panose="020B0604020202020204" pitchFamily="34" charset="0"/>
               <a:buChar char="•"/>
             </a:pPr>
             <a:r>
-              <a:rPr lang="en-CA" b="1"/>
-              <a:t>Immutable:</a:t>
-            </a:r>
-            <a:r>
-              <a:rPr lang="en-CA"/>
-              <a:t> An artifact cannot be modified once it has been written. This requires careful namespacing to prevent conflicts.</a:t>
-            </a:r>
-          </a:p>
-          <a:p>
-            <a:pPr marL="742950" lvl="1" indent="-285750">
-              <a:buFont typeface="Arial" panose="020B0604020202020204" pitchFamily="34" charset="0"/>
-              <a:buChar char="•"/>
-            </a:pPr>
-            <a:r>
-              <a:rPr lang="en-CA" b="1"/>
-              <a:t>Reproducible:</a:t>
-            </a:r>
-            <a:r>
-              <a:rPr lang="en-CA"/>
-              <a:t> To the extent possible, artifacts should be a pure function of their inputs.</a:t>
-            </a:r>
-          </a:p>
-          <a:p>
-            <a:pPr marL="742950" lvl="1" indent="-285750">
-              <a:buFont typeface="Arial" panose="020B0604020202020204" pitchFamily="34" charset="0"/>
-              <a:buChar char="•"/>
-            </a:pPr>
-            <a:r>
-              <a:rPr lang="en-CA" b="1"/>
-              <a:t>Durable:</a:t>
-            </a:r>
-            <a:r>
-              <a:rPr lang="en-CA"/>
-              <a:t> Artifacts, and the metadata which produced them, should remain available for as long as any dependent/dependency continues to exist.</a:t>
-            </a:r>
-            <a:endParaRPr lang="en-CA" b="1"/>
+              <a:rPr lang="en-CA" dirty="0"/>
+              <a:t>Often accomplished with a Spark-based stack</a:t>
+            </a:r>
           </a:p>
         </p:txBody>
       </p:sp>
       <p:pic>
         <p:nvPicPr>
-          <p:cNvPr id="1026" name="Picture 2" descr="example of a training pipeline on Vertex AI Pipelines using Kubeflow">
+          <p:cNvPr id="1026" name="Picture 2" descr="MLOps stages">
             <a:extLst>
               <a:ext uri="{FF2B5EF4-FFF2-40B4-BE49-F238E27FC236}">
-                <a16:creationId xmlns:a16="http://schemas.microsoft.com/office/drawing/2014/main" id="{7A9CBE5D-0ACE-EE69-D40F-1E4247C006C7}"/>
+                <a16:creationId xmlns:a16="http://schemas.microsoft.com/office/drawing/2014/main" id="{BF2FF55D-EE78-5010-04EB-C46A2F1CC88F}"/>
               </a:ext>
             </a:extLst>
           </p:cNvPr>
@@ -7927,8 +8951,8 @@
         </p:blipFill>
         <p:spPr bwMode="auto">
           <a:xfrm>
-            <a:off x="2650499" y="257175"/>
-            <a:ext cx="4057650" cy="6343650"/>
+            <a:off x="0" y="1724628"/>
+            <a:ext cx="7826352" cy="3408743"/>
           </a:xfrm>
           <a:prstGeom prst="rect">
             <a:avLst/>
@@ -7948,7 +8972,7 @@
     </p:spTree>
     <p:extLst>
       <p:ext uri="{BB962C8B-B14F-4D97-AF65-F5344CB8AC3E}">
-        <p14:creationId xmlns:p14="http://schemas.microsoft.com/office/powerpoint/2010/main" val="2919860233"/>
+        <p14:creationId xmlns:p14="http://schemas.microsoft.com/office/powerpoint/2010/main" val="2694113902"/>
       </p:ext>
     </p:extLst>
   </p:cSld>
@@ -7977,10 +9001,10 @@
       </p:grpSpPr>
       <p:sp>
         <p:nvSpPr>
-          <p:cNvPr id="2" name="Title 1">
+          <p:cNvPr id="9" name="Title 8">
             <a:extLst>
               <a:ext uri="{FF2B5EF4-FFF2-40B4-BE49-F238E27FC236}">
-                <a16:creationId xmlns:a16="http://schemas.microsoft.com/office/drawing/2014/main" id="{7863E0BB-52CE-4652-8F0A-0D5DF7773AF2}"/>
+                <a16:creationId xmlns:a16="http://schemas.microsoft.com/office/drawing/2014/main" id="{6B6ECF17-AC73-A854-6E16-98A083AFB5CB}"/>
               </a:ext>
             </a:extLst>
           </p:cNvPr>
@@ -7991,52 +9015,156 @@
             <p:ph type="title"/>
           </p:nvPr>
         </p:nvSpPr>
-        <p:spPr/>
+        <p:spPr>
+          <a:xfrm>
+            <a:off x="8477250" y="603504"/>
+            <a:ext cx="3144774" cy="836549"/>
+          </a:xfrm>
+        </p:spPr>
         <p:txBody>
           <a:bodyPr/>
           <a:lstStyle/>
           <a:p>
             <a:r>
-              <a:rPr lang="en-US"/>
-              <a:t>Vertex Ai</a:t>
-            </a:r>
-            <a:endParaRPr lang="en-US" dirty="0"/>
-          </a:p>
-        </p:txBody>
-      </p:sp>
-      <p:sp>
-        <p:nvSpPr>
-          <p:cNvPr id="3" name="Text Placeholder 2">
+              <a:rPr lang="en-US" sz="2400" dirty="0"/>
+              <a:t>Data Transformation</a:t>
+            </a:r>
+          </a:p>
+        </p:txBody>
+      </p:sp>
+      <p:sp>
+        <p:nvSpPr>
+          <p:cNvPr id="12" name="TextBox 11">
             <a:extLst>
               <a:ext uri="{FF2B5EF4-FFF2-40B4-BE49-F238E27FC236}">
-                <a16:creationId xmlns:a16="http://schemas.microsoft.com/office/drawing/2014/main" id="{4288697C-36CA-4301-AF82-974D9E51273D}"/>
+                <a16:creationId xmlns:a16="http://schemas.microsoft.com/office/drawing/2014/main" id="{3507AAD7-6C14-7076-9044-4801CCD4C7EF}"/>
               </a:ext>
             </a:extLst>
           </p:cNvPr>
-          <p:cNvSpPr>
-            <a:spLocks noGrp="1"/>
-          </p:cNvSpPr>
-          <p:nvPr>
-            <p:ph type="body" idx="1"/>
-          </p:nvPr>
-        </p:nvSpPr>
-        <p:spPr/>
-        <p:txBody>
-          <a:bodyPr/>
+          <p:cNvSpPr txBox="1"/>
+          <p:nvPr/>
+        </p:nvSpPr>
+        <p:spPr>
+          <a:xfrm>
+            <a:off x="8351520" y="1724628"/>
+            <a:ext cx="3356229" cy="4247317"/>
+          </a:xfrm>
+          <a:prstGeom prst="rect">
+            <a:avLst/>
+          </a:prstGeom>
+          <a:noFill/>
+        </p:spPr>
+        <p:txBody>
+          <a:bodyPr wrap="square" rtlCol="0">
+            <a:spAutoFit/>
+          </a:bodyPr>
           <a:lstStyle/>
           <a:p>
             <a:r>
-              <a:rPr lang="en-CA"/>
-              <a:t>Hopefully Google doesn’t get bored of this one anytime soon</a:t>
-            </a:r>
-            <a:endParaRPr lang="en-US" dirty="0"/>
-          </a:p>
-        </p:txBody>
-      </p:sp>
+              <a:rPr lang="en-CA" b="1" dirty="0"/>
+              <a:t>Key Techniques:</a:t>
+            </a:r>
+            <a:r>
+              <a:rPr lang="en-CA" dirty="0"/>
+              <a:t> </a:t>
+            </a:r>
+          </a:p>
+          <a:p>
+            <a:endParaRPr lang="en-CA" b="1" dirty="0"/>
+          </a:p>
+          <a:p>
+            <a:r>
+              <a:rPr lang="en-CA" b="1" dirty="0"/>
+              <a:t>Cleaning:</a:t>
+            </a:r>
+            <a:r>
+              <a:rPr lang="en-CA" dirty="0"/>
+              <a:t> Handling missing values, outliers, and inconsistencies.</a:t>
+            </a:r>
+          </a:p>
+          <a:p>
+            <a:r>
+              <a:rPr lang="en-CA" b="1" dirty="0"/>
+              <a:t>Scaling/Normalization:</a:t>
+            </a:r>
+            <a:r>
+              <a:rPr lang="en-CA" dirty="0"/>
+              <a:t> Ensures features have a similar range.</a:t>
+            </a:r>
+          </a:p>
+          <a:p>
+            <a:r>
+              <a:rPr lang="en-CA" b="1" dirty="0"/>
+              <a:t>Feature Encoding:</a:t>
+            </a:r>
+            <a:r>
+              <a:rPr lang="en-CA" dirty="0"/>
+              <a:t> Converting categorical features to numeric ones.</a:t>
+            </a:r>
+          </a:p>
+          <a:p>
+            <a:r>
+              <a:rPr lang="en-CA" b="1" dirty="0"/>
+              <a:t>Creation of New Features:</a:t>
+            </a:r>
+            <a:r>
+              <a:rPr lang="en-CA" dirty="0"/>
+              <a:t> Combining or calculating features to increase model understanding.</a:t>
+            </a:r>
+          </a:p>
+        </p:txBody>
+      </p:sp>
+      <p:pic>
+        <p:nvPicPr>
+          <p:cNvPr id="1026" name="Picture 2" descr="MLOps stages">
+            <a:extLst>
+              <a:ext uri="{FF2B5EF4-FFF2-40B4-BE49-F238E27FC236}">
+                <a16:creationId xmlns:a16="http://schemas.microsoft.com/office/drawing/2014/main" id="{BF2FF55D-EE78-5010-04EB-C46A2F1CC88F}"/>
+              </a:ext>
+            </a:extLst>
+          </p:cNvPr>
+          <p:cNvPicPr>
+            <a:picLocks noChangeAspect="1" noChangeArrowheads="1"/>
+          </p:cNvPicPr>
+          <p:nvPr/>
+        </p:nvPicPr>
+        <p:blipFill>
+          <a:blip r:embed="rId2">
+            <a:extLst>
+              <a:ext uri="{28A0092B-C50C-407E-A947-70E740481C1C}">
+                <a14:useLocalDpi xmlns:a14="http://schemas.microsoft.com/office/drawing/2010/main" val="0"/>
+              </a:ext>
+            </a:extLst>
+          </a:blip>
+          <a:srcRect/>
+          <a:stretch>
+            <a:fillRect/>
+          </a:stretch>
+        </p:blipFill>
+        <p:spPr bwMode="auto">
+          <a:xfrm>
+            <a:off x="0" y="1724628"/>
+            <a:ext cx="7826352" cy="3408743"/>
+          </a:xfrm>
+          <a:prstGeom prst="rect">
+            <a:avLst/>
+          </a:prstGeom>
+          <a:noFill/>
+          <a:extLst>
+            <a:ext uri="{909E8E84-426E-40DD-AFC4-6F175D3DCCD1}">
+              <a14:hiddenFill xmlns:a14="http://schemas.microsoft.com/office/drawing/2010/main">
+                <a:solidFill>
+                  <a:srgbClr val="FFFFFF"/>
+                </a:solidFill>
+              </a14:hiddenFill>
+            </a:ext>
+          </a:extLst>
+        </p:spPr>
+      </p:pic>
     </p:spTree>
     <p:extLst>
       <p:ext uri="{BB962C8B-B14F-4D97-AF65-F5344CB8AC3E}">
-        <p14:creationId xmlns:p14="http://schemas.microsoft.com/office/powerpoint/2010/main" val="2687529475"/>
+        <p14:creationId xmlns:p14="http://schemas.microsoft.com/office/powerpoint/2010/main" val="2117328129"/>
       </p:ext>
     </p:extLst>
   </p:cSld>
@@ -8081,8 +9209,8 @@
         </p:nvSpPr>
         <p:spPr>
           <a:xfrm>
-            <a:off x="8477250" y="603504"/>
-            <a:ext cx="3144774" cy="524905"/>
+            <a:off x="8477250" y="603505"/>
+            <a:ext cx="3144774" cy="493776"/>
           </a:xfrm>
         </p:spPr>
         <p:txBody>
@@ -8090,10 +9218,9 @@
           <a:lstStyle/>
           <a:p>
             <a:r>
-              <a:rPr lang="en-US" sz="2400"/>
-              <a:t>What is Vertex AI?</a:t>
-            </a:r>
-            <a:endParaRPr lang="en-US" sz="2400" dirty="0"/>
+              <a:rPr lang="en-US" sz="2400" dirty="0"/>
+              <a:t>Model Training</a:t>
+            </a:r>
           </a:p>
         </p:txBody>
       </p:sp>
@@ -8111,8 +9238,8 @@
         </p:nvSpPr>
         <p:spPr>
           <a:xfrm>
-            <a:off x="8385244" y="1495425"/>
-            <a:ext cx="3322506" cy="3970318"/>
+            <a:off x="8265795" y="1360848"/>
+            <a:ext cx="3356229" cy="4893647"/>
           </a:xfrm>
           <a:prstGeom prst="rect">
             <a:avLst/>
@@ -8130,18 +9257,8 @@
               <a:buChar char="•"/>
             </a:pPr>
             <a:r>
-              <a:rPr lang="en-US" sz="1400"/>
-              <a:t>Vertex AI is simply an umbrella marketing term for a variety of independent Data/AI-focused GCP services, some new and some old.</a:t>
-            </a:r>
-          </a:p>
-          <a:p>
-            <a:pPr marL="742950" lvl="1" indent="-285750">
-              <a:buFont typeface="Arial" panose="020B0604020202020204" pitchFamily="34" charset="0"/>
-              <a:buChar char="•"/>
-            </a:pPr>
-            <a:r>
-              <a:rPr lang="en-US" sz="1400"/>
-              <a:t>The term “Vertex” doesn’t actually appear in any of the Google Cloud APIs, SDK commands, or Terraform modules, except in docstrings!</a:t>
+              <a:rPr lang="en-CA" sz="1200" dirty="0"/>
+              <a:t>We divide our dataset into training and testing sets. A model learns patterns from the training set, but performance on the held-out test set gives us a true assessment of how well it generalizes to unseen data.</a:t>
             </a:r>
           </a:p>
           <a:p>
@@ -8150,24 +9267,43 @@
               <a:buChar char="•"/>
             </a:pPr>
             <a:r>
-              <a:rPr lang="en-US" sz="1400"/>
-              <a:t>The goal is clearly to unify and highlight synergies between GCP services on the entire “Data⇒Value” journey, to incentivize developers away from more easily-portable “Kubeflow-on-GKE” designs.</a:t>
-            </a:r>
-            <a:endParaRPr lang="en-US" sz="1400" dirty="0"/>
+              <a:rPr lang="en-CA" sz="1200" dirty="0"/>
+              <a:t>Metrics calculated on the test set (e.g., accuracy, F1-score) tell us how good our model is, helping us decide if we're satisfied or need to make adjustments.</a:t>
+            </a:r>
+          </a:p>
+          <a:p>
+            <a:pPr marL="285750" indent="-285750">
+              <a:buFont typeface="Arial" panose="020B0604020202020204" pitchFamily="34" charset="0"/>
+              <a:buChar char="•"/>
+            </a:pPr>
+            <a:r>
+              <a:rPr lang="en-CA" sz="1200" dirty="0"/>
+              <a:t>Before training, we often don't know the ideal settings (hyperparameters) for our model. These control the learning process itself. We might perform many training runs using different combinations of hyperparameters, comparing results on the test set.</a:t>
+            </a:r>
+          </a:p>
+          <a:p>
+            <a:pPr marL="285750" indent="-285750">
+              <a:buFont typeface="Arial" panose="020B0604020202020204" pitchFamily="34" charset="0"/>
+              <a:buChar char="•"/>
+            </a:pPr>
+            <a:r>
+              <a:rPr lang="en-CA" sz="1200" dirty="0"/>
+              <a:t>This is actually a cyclic process–evaluation metrics guide us to try again with different model specifications or hyperparameters. The goal is to find the combination leading to the best possible performance on the test set</a:t>
+            </a:r>
           </a:p>
         </p:txBody>
       </p:sp>
       <p:pic>
         <p:nvPicPr>
-          <p:cNvPr id="2" name="Picture 1" descr="Graphical user interface&#10;&#10;Description automatically generated">
+          <p:cNvPr id="5122" name="Picture 2">
             <a:extLst>
               <a:ext uri="{FF2B5EF4-FFF2-40B4-BE49-F238E27FC236}">
-                <a16:creationId xmlns:a16="http://schemas.microsoft.com/office/drawing/2014/main" id="{09B0CEB7-1772-A7A5-C63B-825DE241A9EF}"/>
+                <a16:creationId xmlns:a16="http://schemas.microsoft.com/office/drawing/2014/main" id="{2473BFB6-BA82-87C5-7DC1-358895A80B3D}"/>
               </a:ext>
             </a:extLst>
           </p:cNvPr>
           <p:cNvPicPr>
-            <a:picLocks noChangeAspect="1"/>
+            <a:picLocks noChangeAspect="1" noChangeArrowheads="1"/>
           </p:cNvPicPr>
           <p:nvPr/>
         </p:nvPicPr>
@@ -8179,24 +9315,35 @@
               </a:ext>
             </a:extLst>
           </a:blip>
+          <a:srcRect/>
           <a:stretch>
             <a:fillRect/>
           </a:stretch>
         </p:blipFill>
-        <p:spPr>
-          <a:xfrm>
-            <a:off x="409848" y="1884532"/>
-            <a:ext cx="7198377" cy="3329494"/>
+        <p:spPr bwMode="auto">
+          <a:xfrm>
+            <a:off x="256032" y="2110748"/>
+            <a:ext cx="7594866" cy="2636503"/>
           </a:xfrm>
           <a:prstGeom prst="rect">
             <a:avLst/>
           </a:prstGeom>
+          <a:noFill/>
+          <a:extLst>
+            <a:ext uri="{909E8E84-426E-40DD-AFC4-6F175D3DCCD1}">
+              <a14:hiddenFill xmlns:a14="http://schemas.microsoft.com/office/drawing/2010/main">
+                <a:solidFill>
+                  <a:srgbClr val="FFFFFF"/>
+                </a:solidFill>
+              </a14:hiddenFill>
+            </a:ext>
+          </a:extLst>
         </p:spPr>
       </p:pic>
     </p:spTree>
     <p:extLst>
       <p:ext uri="{BB962C8B-B14F-4D97-AF65-F5344CB8AC3E}">
-        <p14:creationId xmlns:p14="http://schemas.microsoft.com/office/powerpoint/2010/main" val="4274386115"/>
+        <p14:creationId xmlns:p14="http://schemas.microsoft.com/office/powerpoint/2010/main" val="1611877077"/>
       </p:ext>
     </p:extLst>
   </p:cSld>
@@ -8225,82 +9372,6 @@
       </p:grpSpPr>
       <p:sp>
         <p:nvSpPr>
-          <p:cNvPr id="15" name="Arrow: Circular 14">
-            <a:extLst>
-              <a:ext uri="{FF2B5EF4-FFF2-40B4-BE49-F238E27FC236}">
-                <a16:creationId xmlns:a16="http://schemas.microsoft.com/office/drawing/2014/main" id="{45DEA589-C81D-703A-B683-859BE2C8AEAC}"/>
-              </a:ext>
-            </a:extLst>
-          </p:cNvPr>
-          <p:cNvSpPr/>
-          <p:nvPr/>
-        </p:nvSpPr>
-        <p:spPr>
-          <a:xfrm>
-            <a:off x="340468" y="1506330"/>
-            <a:ext cx="7684851" cy="4310809"/>
-          </a:xfrm>
-          <a:prstGeom prst="circularArrow">
-            <a:avLst>
-              <a:gd name="adj1" fmla="val 6445"/>
-              <a:gd name="adj2" fmla="val 704844"/>
-              <a:gd name="adj3" fmla="val 20095681"/>
-              <a:gd name="adj4" fmla="val 814020"/>
-              <a:gd name="adj5" fmla="val 10269"/>
-            </a:avLst>
-          </a:prstGeom>
-          <a:solidFill>
-            <a:schemeClr val="accent2">
-              <a:lumMod val="40000"/>
-              <a:lumOff val="60000"/>
-            </a:schemeClr>
-          </a:solidFill>
-          <a:ln>
-            <a:solidFill>
-              <a:schemeClr val="accent2">
-                <a:lumMod val="75000"/>
-              </a:schemeClr>
-            </a:solidFill>
-          </a:ln>
-          <a:effectLst>
-            <a:outerShdw blurRad="50800" dist="38100" dir="5400000" algn="t" rotWithShape="0">
-              <a:prstClr val="black">
-                <a:alpha val="40000"/>
-              </a:prstClr>
-            </a:outerShdw>
-          </a:effectLst>
-        </p:spPr>
-        <p:style>
-          <a:lnRef idx="2">
-            <a:schemeClr val="accent1">
-              <a:shade val="50000"/>
-            </a:schemeClr>
-          </a:lnRef>
-          <a:fillRef idx="1">
-            <a:schemeClr val="accent1"/>
-          </a:fillRef>
-          <a:effectRef idx="0">
-            <a:schemeClr val="accent1"/>
-          </a:effectRef>
-          <a:fontRef idx="minor">
-            <a:schemeClr val="lt1"/>
-          </a:fontRef>
-        </p:style>
-        <p:txBody>
-          <a:bodyPr rtlCol="0" anchor="t"/>
-          <a:lstStyle/>
-          <a:p>
-            <a:pPr algn="ctr"/>
-            <a:endParaRPr lang="en-CA">
-              <a:solidFill>
-                <a:schemeClr val="tx1"/>
-              </a:solidFill>
-            </a:endParaRPr>
-          </a:p>
-        </p:txBody>
-      </p:sp>
-      <p:sp>
-        <p:nvSpPr>
           <p:cNvPr id="9" name="Title 8">
             <a:extLst>
               <a:ext uri="{FF2B5EF4-FFF2-40B4-BE49-F238E27FC236}">
@@ -8317,8 +9388,8 @@
         </p:nvSpPr>
         <p:spPr>
           <a:xfrm>
-            <a:off x="8477250" y="603504"/>
-            <a:ext cx="3144774" cy="524905"/>
+            <a:off x="8477250" y="603505"/>
+            <a:ext cx="3144774" cy="493776"/>
           </a:xfrm>
         </p:spPr>
         <p:txBody>
@@ -8326,10 +9397,9 @@
           <a:lstStyle/>
           <a:p>
             <a:r>
-              <a:rPr lang="en-US" sz="2400"/>
-              <a:t>Machine Learning Lifecycle</a:t>
-            </a:r>
-            <a:endParaRPr lang="en-US" sz="2400" dirty="0"/>
+              <a:rPr lang="en-US" sz="2400" dirty="0"/>
+              <a:t>Model Serving</a:t>
+            </a:r>
           </a:p>
         </p:txBody>
       </p:sp>
@@ -8347,8 +9417,8 @@
         </p:nvSpPr>
         <p:spPr>
           <a:xfrm>
-            <a:off x="8562975" y="1495425"/>
-            <a:ext cx="3144774" cy="2031325"/>
+            <a:off x="8265795" y="1360848"/>
+            <a:ext cx="3356229" cy="5078313"/>
           </a:xfrm>
           <a:prstGeom prst="rect">
             <a:avLst/>
@@ -8361,204 +9431,103 @@
           </a:bodyPr>
           <a:lstStyle/>
           <a:p>
-            <a:r>
-              <a:rPr lang="en-US"/>
-              <a:t>Unlike traditional software systems that operate deterministically according to requirements and algorithms that are determined </a:t>
-            </a:r>
-            <a:endParaRPr lang="en-CA"/>
-          </a:p>
-        </p:txBody>
-      </p:sp>
-      <p:sp>
-        <p:nvSpPr>
-          <p:cNvPr id="19" name="TextBox 18">
+            <a:pPr marL="285750" indent="-285750">
+              <a:buFont typeface="Arial" panose="020B0604020202020204" pitchFamily="34" charset="0"/>
+              <a:buChar char="•"/>
+            </a:pPr>
+            <a:r>
+              <a:rPr lang="en-CA" sz="1200" dirty="0"/>
+              <a:t>At the end of the day, a model is just a bunch of weights – </a:t>
+            </a:r>
+            <a:r>
+              <a:rPr lang="en-CA" sz="1200" dirty="0" err="1"/>
+              <a:t>i.e</a:t>
+            </a:r>
+            <a:r>
+              <a:rPr lang="en-CA" sz="1200" dirty="0"/>
+              <a:t>, a block of numbers in a file.</a:t>
+            </a:r>
+          </a:p>
+          <a:p>
+            <a:pPr marL="285750" indent="-285750">
+              <a:buFont typeface="Arial" panose="020B0604020202020204" pitchFamily="34" charset="0"/>
+              <a:buChar char="•"/>
+            </a:pPr>
+            <a:r>
+              <a:rPr lang="en-CA" sz="1200" dirty="0"/>
+              <a:t>It’s up to some sort of routine to load these numbers into an architecture that can use them to make predictions; this stage is often called “inference”</a:t>
+            </a:r>
+          </a:p>
+          <a:p>
+            <a:pPr marL="285750" indent="-285750">
+              <a:buFont typeface="Arial" panose="020B0604020202020204" pitchFamily="34" charset="0"/>
+              <a:buChar char="•"/>
+            </a:pPr>
+            <a:r>
+              <a:rPr lang="en-CA" sz="1200" dirty="0"/>
+              <a:t>Deployment options can vary:</a:t>
+            </a:r>
+          </a:p>
+          <a:p>
+            <a:pPr marL="742950" lvl="1" indent="-285750">
+              <a:buFont typeface="Arial" panose="020B0604020202020204" pitchFamily="34" charset="0"/>
+              <a:buChar char="•"/>
+            </a:pPr>
+            <a:r>
+              <a:rPr lang="en-CA" sz="1200" b="1" dirty="0"/>
+              <a:t>REST APIs</a:t>
+            </a:r>
+            <a:r>
+              <a:rPr lang="en-CA" sz="1200" dirty="0"/>
+              <a:t>: A common way to interact with models – apps send data, get a prediction in response.</a:t>
+            </a:r>
+          </a:p>
+          <a:p>
+            <a:pPr marL="742950" lvl="1" indent="-285750">
+              <a:buFont typeface="Arial" panose="020B0604020202020204" pitchFamily="34" charset="0"/>
+              <a:buChar char="•"/>
+            </a:pPr>
+            <a:r>
+              <a:rPr lang="en-CA" sz="1200" b="1" dirty="0"/>
+              <a:t>Batch-mode Inference</a:t>
+            </a:r>
+            <a:r>
+              <a:rPr lang="en-CA" sz="1200" dirty="0"/>
+              <a:t>: Predicting on larger datasets less frequently, perhaps on a schedule.</a:t>
+            </a:r>
+          </a:p>
+          <a:p>
+            <a:pPr marL="742950" lvl="1" indent="-285750">
+              <a:buFont typeface="Arial" panose="020B0604020202020204" pitchFamily="34" charset="0"/>
+              <a:buChar char="•"/>
+            </a:pPr>
+            <a:r>
+              <a:rPr lang="en-CA" sz="1200" b="1" dirty="0"/>
+              <a:t>Edge Deployment</a:t>
+            </a:r>
+            <a:r>
+              <a:rPr lang="en-CA" sz="1200" dirty="0"/>
+              <a:t>: Placing models on specialized devices directly where data is generated (e.g., self-driving car models).</a:t>
+            </a:r>
+          </a:p>
+          <a:p>
+            <a:pPr marL="285750" indent="-285750">
+              <a:buFont typeface="Arial" panose="020B0604020202020204" pitchFamily="34" charset="0"/>
+              <a:buChar char="•"/>
+            </a:pPr>
+            <a:r>
+              <a:rPr lang="en-CA" sz="1200" dirty="0"/>
+              <a:t>No matter which deployment option you’re in, you almost certainly want to have some way to continuously monitor the quality of the generated inferences.</a:t>
+            </a:r>
+          </a:p>
+        </p:txBody>
+      </p:sp>
+      <p:pic>
+        <p:nvPicPr>
+          <p:cNvPr id="6146" name="Picture 2" descr="Databricks MLflow architecture highlighting Model Serving, giving data teams end-to-end control of the real-time machine learning model development and deployment lifecycle.">
             <a:extLst>
               <a:ext uri="{FF2B5EF4-FFF2-40B4-BE49-F238E27FC236}">
-                <a16:creationId xmlns:a16="http://schemas.microsoft.com/office/drawing/2014/main" id="{653D03A6-9A32-052E-30DC-DE8EB5C71DEF}"/>
-              </a:ext>
-            </a:extLst>
-          </p:cNvPr>
-          <p:cNvSpPr txBox="1"/>
-          <p:nvPr/>
-        </p:nvSpPr>
-        <p:spPr>
-          <a:xfrm>
-            <a:off x="5777418" y="5281077"/>
-            <a:ext cx="2247900" cy="369332"/>
-          </a:xfrm>
-          <a:prstGeom prst="rect">
-            <a:avLst/>
-          </a:prstGeom>
-          <a:noFill/>
-        </p:spPr>
-        <p:txBody>
-          <a:bodyPr wrap="square" rtlCol="0">
-            <a:spAutoFit/>
-          </a:bodyPr>
-          <a:lstStyle/>
-          <a:p>
-            <a:pPr algn="r"/>
-            <a:r>
-              <a:rPr lang="en-US"/>
-              <a:t>Feature Extraction</a:t>
-            </a:r>
-            <a:endParaRPr lang="en-CA"/>
-          </a:p>
-        </p:txBody>
-      </p:sp>
-      <p:sp>
-        <p:nvSpPr>
-          <p:cNvPr id="20" name="TextBox 19">
-            <a:extLst>
-              <a:ext uri="{FF2B5EF4-FFF2-40B4-BE49-F238E27FC236}">
-                <a16:creationId xmlns:a16="http://schemas.microsoft.com/office/drawing/2014/main" id="{1AA3310C-2580-E03B-B074-B51AA6D93A83}"/>
-              </a:ext>
-            </a:extLst>
-          </p:cNvPr>
-          <p:cNvSpPr txBox="1"/>
-          <p:nvPr/>
-        </p:nvSpPr>
-        <p:spPr>
-          <a:xfrm>
-            <a:off x="212791" y="5270171"/>
-            <a:ext cx="2247900" cy="369332"/>
-          </a:xfrm>
-          <a:prstGeom prst="rect">
-            <a:avLst/>
-          </a:prstGeom>
-          <a:noFill/>
-        </p:spPr>
-        <p:txBody>
-          <a:bodyPr wrap="square" rtlCol="0">
-            <a:spAutoFit/>
-          </a:bodyPr>
-          <a:lstStyle/>
-          <a:p>
-            <a:pPr algn="ctr"/>
-            <a:r>
-              <a:rPr lang="en-US"/>
-              <a:t>Training</a:t>
-            </a:r>
-            <a:endParaRPr lang="en-CA"/>
-          </a:p>
-        </p:txBody>
-      </p:sp>
-      <p:sp>
-        <p:nvSpPr>
-          <p:cNvPr id="21" name="TextBox 20">
-            <a:extLst>
-              <a:ext uri="{FF2B5EF4-FFF2-40B4-BE49-F238E27FC236}">
-                <a16:creationId xmlns:a16="http://schemas.microsoft.com/office/drawing/2014/main" id="{2B327E6D-FB04-0B20-D2B9-D2D5C5C3B8EB}"/>
-              </a:ext>
-            </a:extLst>
-          </p:cNvPr>
-          <p:cNvSpPr txBox="1"/>
-          <p:nvPr/>
-        </p:nvSpPr>
-        <p:spPr>
-          <a:xfrm>
-            <a:off x="910345" y="1506330"/>
-            <a:ext cx="2247900" cy="369332"/>
-          </a:xfrm>
-          <a:prstGeom prst="rect">
-            <a:avLst/>
-          </a:prstGeom>
-          <a:noFill/>
-        </p:spPr>
-        <p:txBody>
-          <a:bodyPr wrap="square" rtlCol="0">
-            <a:spAutoFit/>
-          </a:bodyPr>
-          <a:lstStyle/>
-          <a:p>
-            <a:pPr algn="ctr"/>
-            <a:r>
-              <a:rPr lang="en-US"/>
-              <a:t>Inference</a:t>
-            </a:r>
-            <a:endParaRPr lang="en-CA"/>
-          </a:p>
-        </p:txBody>
-      </p:sp>
-      <p:sp>
-        <p:nvSpPr>
-          <p:cNvPr id="22" name="TextBox 21">
-            <a:extLst>
-              <a:ext uri="{FF2B5EF4-FFF2-40B4-BE49-F238E27FC236}">
-                <a16:creationId xmlns:a16="http://schemas.microsoft.com/office/drawing/2014/main" id="{4B129865-3C69-96A0-92F6-AAA72780AA01}"/>
-              </a:ext>
-            </a:extLst>
-          </p:cNvPr>
-          <p:cNvSpPr txBox="1"/>
-          <p:nvPr/>
-        </p:nvSpPr>
-        <p:spPr>
-          <a:xfrm>
-            <a:off x="5320827" y="1589334"/>
-            <a:ext cx="2247900" cy="369332"/>
-          </a:xfrm>
-          <a:prstGeom prst="rect">
-            <a:avLst/>
-          </a:prstGeom>
-          <a:noFill/>
-        </p:spPr>
-        <p:txBody>
-          <a:bodyPr wrap="square" rtlCol="0">
-            <a:spAutoFit/>
-          </a:bodyPr>
-          <a:lstStyle/>
-          <a:p>
-            <a:pPr algn="ctr"/>
-            <a:r>
-              <a:rPr lang="en-US"/>
-              <a:t>Monitoring</a:t>
-            </a:r>
-            <a:endParaRPr lang="en-CA"/>
-          </a:p>
-        </p:txBody>
-      </p:sp>
-      <p:pic>
-        <p:nvPicPr>
-          <p:cNvPr id="13" name="Graphic 12">
-            <a:extLst>
-              <a:ext uri="{FF2B5EF4-FFF2-40B4-BE49-F238E27FC236}">
-                <a16:creationId xmlns:a16="http://schemas.microsoft.com/office/drawing/2014/main" id="{777B50D0-C8A6-3017-D2F9-5E119B968490}"/>
-              </a:ext>
-            </a:extLst>
-          </p:cNvPr>
-          <p:cNvPicPr>
-            <a:picLocks noChangeAspect="1"/>
-          </p:cNvPicPr>
-          <p:nvPr/>
-        </p:nvPicPr>
-        <p:blipFill>
-          <a:blip r:embed="rId2">
-            <a:extLst>
-              <a:ext uri="{96DAC541-7B7A-43D3-8B79-37D633B846F1}">
-                <asvg:svgBlip xmlns:asvg="http://schemas.microsoft.com/office/drawing/2016/SVG/main" r:embed="rId3"/>
-              </a:ext>
-            </a:extLst>
-          </a:blip>
-          <a:stretch>
-            <a:fillRect/>
-          </a:stretch>
-        </p:blipFill>
-        <p:spPr>
-          <a:xfrm>
-            <a:off x="6608524" y="3005117"/>
-            <a:ext cx="1313234" cy="1313234"/>
-          </a:xfrm>
-          <a:prstGeom prst="rect">
-            <a:avLst/>
-          </a:prstGeom>
-        </p:spPr>
-      </p:pic>
-      <p:pic>
-        <p:nvPicPr>
-          <p:cNvPr id="1032" name="Picture 8" descr="Google Cloud AutoML">
-            <a:extLst>
-              <a:ext uri="{FF2B5EF4-FFF2-40B4-BE49-F238E27FC236}">
-                <a16:creationId xmlns:a16="http://schemas.microsoft.com/office/drawing/2014/main" id="{91709BD1-52B8-94C1-CFB4-AD642321EC62}"/>
+                <a16:creationId xmlns:a16="http://schemas.microsoft.com/office/drawing/2014/main" id="{8E6A083C-23ED-ABB6-80BB-A98FC429FEB0}"/>
               </a:ext>
             </a:extLst>
           </p:cNvPr>
@@ -8568,7 +9537,7 @@
           <p:nvPr/>
         </p:nvPicPr>
         <p:blipFill>
-          <a:blip r:embed="rId4">
+          <a:blip r:embed="rId2">
             <a:extLst>
               <a:ext uri="{28A0092B-C50C-407E-A947-70E740481C1C}">
                 <a14:useLocalDpi xmlns:a14="http://schemas.microsoft.com/office/drawing/2010/main" val="0"/>
@@ -8582,8 +9551,8 @@
         </p:blipFill>
         <p:spPr bwMode="auto">
           <a:xfrm>
-            <a:off x="3158245" y="4157399"/>
-            <a:ext cx="1194271" cy="1194271"/>
+            <a:off x="243839" y="1803781"/>
+            <a:ext cx="7813263" cy="3536315"/>
           </a:xfrm>
           <a:prstGeom prst="rect">
             <a:avLst/>
@@ -8600,199 +9569,10 @@
           </a:extLst>
         </p:spPr>
       </p:pic>
-      <p:pic>
-        <p:nvPicPr>
-          <p:cNvPr id="1034" name="Picture 10" descr="Python Logo transparent PNG - StickPNG">
-            <a:extLst>
-              <a:ext uri="{FF2B5EF4-FFF2-40B4-BE49-F238E27FC236}">
-                <a16:creationId xmlns:a16="http://schemas.microsoft.com/office/drawing/2014/main" id="{482A3B94-1E53-6AD4-3A3B-21A725979521}"/>
-              </a:ext>
-            </a:extLst>
-          </p:cNvPr>
-          <p:cNvPicPr>
-            <a:picLocks noChangeAspect="1" noChangeArrowheads="1"/>
-          </p:cNvPicPr>
-          <p:nvPr/>
-        </p:nvPicPr>
-        <p:blipFill>
-          <a:blip r:embed="rId5">
-            <a:extLst>
-              <a:ext uri="{28A0092B-C50C-407E-A947-70E740481C1C}">
-                <a14:useLocalDpi xmlns:a14="http://schemas.microsoft.com/office/drawing/2010/main" val="0"/>
-              </a:ext>
-            </a:extLst>
-          </a:blip>
-          <a:srcRect/>
-          <a:stretch>
-            <a:fillRect/>
-          </a:stretch>
-        </p:blipFill>
-        <p:spPr bwMode="auto">
-          <a:xfrm>
-            <a:off x="4117303" y="5281077"/>
-            <a:ext cx="1203524" cy="1198841"/>
-          </a:xfrm>
-          <a:prstGeom prst="rect">
-            <a:avLst/>
-          </a:prstGeom>
-          <a:noFill/>
-          <a:extLst>
-            <a:ext uri="{909E8E84-426E-40DD-AFC4-6F175D3DCCD1}">
-              <a14:hiddenFill xmlns:a14="http://schemas.microsoft.com/office/drawing/2010/main">
-                <a:solidFill>
-                  <a:srgbClr val="FFFFFF"/>
-                </a:solidFill>
-              </a14:hiddenFill>
-            </a:ext>
-          </a:extLst>
-        </p:spPr>
-      </p:pic>
-      <p:sp>
-        <p:nvSpPr>
-          <p:cNvPr id="23" name="Rectangle 22">
-            <a:extLst>
-              <a:ext uri="{FF2B5EF4-FFF2-40B4-BE49-F238E27FC236}">
-                <a16:creationId xmlns:a16="http://schemas.microsoft.com/office/drawing/2014/main" id="{7085C738-CED9-D6D6-5CFA-1ACC5D524633}"/>
-              </a:ext>
-            </a:extLst>
-          </p:cNvPr>
-          <p:cNvSpPr/>
-          <p:nvPr/>
-        </p:nvSpPr>
-        <p:spPr>
-          <a:xfrm rot="20293634">
-            <a:off x="2825487" y="5223348"/>
-            <a:ext cx="2860776" cy="199098"/>
-          </a:xfrm>
-          <a:prstGeom prst="rect">
-            <a:avLst/>
-          </a:prstGeom>
-          <a:scene3d>
-            <a:camera prst="isometricOffAxis1Top"/>
-            <a:lightRig rig="threePt" dir="t"/>
-          </a:scene3d>
-        </p:spPr>
-        <p:style>
-          <a:lnRef idx="3">
-            <a:schemeClr val="lt1"/>
-          </a:lnRef>
-          <a:fillRef idx="1">
-            <a:schemeClr val="accent3"/>
-          </a:fillRef>
-          <a:effectRef idx="1">
-            <a:schemeClr val="accent3"/>
-          </a:effectRef>
-          <a:fontRef idx="minor">
-            <a:schemeClr val="lt1"/>
-          </a:fontRef>
-        </p:style>
-        <p:txBody>
-          <a:bodyPr rtlCol="0" anchor="ctr"/>
-          <a:lstStyle/>
-          <a:p>
-            <a:pPr algn="ctr"/>
-            <a:endParaRPr lang="en-CA"/>
-          </a:p>
-        </p:txBody>
-      </p:sp>
-      <p:pic>
-        <p:nvPicPr>
-          <p:cNvPr id="1038" name="Picture 14" descr="Imaginary Cloud: Web, Mobile, UI/UX Design &amp; AI Development">
-            <a:extLst>
-              <a:ext uri="{FF2B5EF4-FFF2-40B4-BE49-F238E27FC236}">
-                <a16:creationId xmlns:a16="http://schemas.microsoft.com/office/drawing/2014/main" id="{D91DC787-BFD6-39F6-84F8-E6044471A328}"/>
-              </a:ext>
-            </a:extLst>
-          </p:cNvPr>
-          <p:cNvPicPr>
-            <a:picLocks noChangeAspect="1" noChangeArrowheads="1"/>
-          </p:cNvPicPr>
-          <p:nvPr/>
-        </p:nvPicPr>
-        <p:blipFill>
-          <a:blip r:embed="rId6">
-            <a:extLst>
-              <a:ext uri="{28A0092B-C50C-407E-A947-70E740481C1C}">
-                <a14:useLocalDpi xmlns:a14="http://schemas.microsoft.com/office/drawing/2010/main" val="0"/>
-              </a:ext>
-            </a:extLst>
-          </a:blip>
-          <a:srcRect/>
-          <a:stretch>
-            <a:fillRect/>
-          </a:stretch>
-        </p:blipFill>
-        <p:spPr bwMode="auto">
-          <a:xfrm>
-            <a:off x="284214" y="2831864"/>
-            <a:ext cx="1052527" cy="1194271"/>
-          </a:xfrm>
-          <a:prstGeom prst="rect">
-            <a:avLst/>
-          </a:prstGeom>
-          <a:noFill/>
-          <a:extLst>
-            <a:ext uri="{909E8E84-426E-40DD-AFC4-6F175D3DCCD1}">
-              <a14:hiddenFill xmlns:a14="http://schemas.microsoft.com/office/drawing/2010/main">
-                <a:solidFill>
-                  <a:srgbClr val="FFFFFF"/>
-                </a:solidFill>
-              </a14:hiddenFill>
-            </a:ext>
-          </a:extLst>
-        </p:spPr>
-      </p:pic>
-      <p:pic>
-        <p:nvPicPr>
-          <p:cNvPr id="1040" name="Picture 16">
-            <a:extLst>
-              <a:ext uri="{FF2B5EF4-FFF2-40B4-BE49-F238E27FC236}">
-                <a16:creationId xmlns:a16="http://schemas.microsoft.com/office/drawing/2014/main" id="{EFF4432E-0572-355C-EB7A-83E2753903E1}"/>
-              </a:ext>
-            </a:extLst>
-          </p:cNvPr>
-          <p:cNvPicPr>
-            <a:picLocks noChangeAspect="1" noChangeArrowheads="1"/>
-          </p:cNvPicPr>
-          <p:nvPr/>
-        </p:nvPicPr>
-        <p:blipFill>
-          <a:blip r:embed="rId7">
-            <a:extLst>
-              <a:ext uri="{28A0092B-C50C-407E-A947-70E740481C1C}">
-                <a14:useLocalDpi xmlns:a14="http://schemas.microsoft.com/office/drawing/2010/main" val="0"/>
-              </a:ext>
-            </a:extLst>
-          </a:blip>
-          <a:srcRect/>
-          <a:stretch>
-            <a:fillRect/>
-          </a:stretch>
-        </p:blipFill>
-        <p:spPr bwMode="auto">
-          <a:xfrm>
-            <a:off x="3072927" y="705812"/>
-            <a:ext cx="2247900" cy="1168440"/>
-          </a:xfrm>
-          <a:prstGeom prst="rect">
-            <a:avLst/>
-          </a:prstGeom>
-          <a:noFill/>
-          <a:extLst>
-            <a:ext uri="{909E8E84-426E-40DD-AFC4-6F175D3DCCD1}">
-              <a14:hiddenFill xmlns:a14="http://schemas.microsoft.com/office/drawing/2010/main">
-                <a:solidFill>
-                  <a:srgbClr val="FFFFFF"/>
-                </a:solidFill>
-              </a14:hiddenFill>
-            </a:ext>
-          </a:extLst>
-        </p:spPr>
-      </p:pic>
     </p:spTree>
     <p:extLst>
       <p:ext uri="{BB962C8B-B14F-4D97-AF65-F5344CB8AC3E}">
-        <p14:creationId xmlns:p14="http://schemas.microsoft.com/office/powerpoint/2010/main" val="672058878"/>
+        <p14:creationId xmlns:p14="http://schemas.microsoft.com/office/powerpoint/2010/main" val="2784123560"/>
       </p:ext>
     </p:extLst>
   </p:cSld>
@@ -9669,21 +10449,21 @@
 </file>
 
 <file path=customXml/item1.xml><?xml version="1.0" encoding="utf-8"?>
+<?mso-contentType ?>
+<FormTemplates xmlns="http://schemas.microsoft.com/sharepoint/v3/contenttype/forms">
+  <Display>DocumentLibraryForm</Display>
+  <Edit>DocumentLibraryForm</Edit>
+  <New>DocumentLibraryForm</New>
+</FormTemplates>
+</file>
+
+<file path=customXml/item2.xml><?xml version="1.0" encoding="utf-8"?>
 <p:properties xmlns:p="http://schemas.microsoft.com/office/2006/metadata/properties" xmlns:xsi="http://www.w3.org/2001/XMLSchema-instance" xmlns:pc="http://schemas.microsoft.com/office/infopath/2007/PartnerControls">
   <documentManagement>
     <Status xmlns="71af3243-3dd4-4a8d-8c0d-dd76da1f02a5">Not started</Status>
     <MediaServiceKeyPoints xmlns="71af3243-3dd4-4a8d-8c0d-dd76da1f02a5" xsi:nil="true"/>
   </documentManagement>
 </p:properties>
-</file>
-
-<file path=customXml/item2.xml><?xml version="1.0" encoding="utf-8"?>
-<?mso-contentType ?>
-<FormTemplates xmlns="http://schemas.microsoft.com/sharepoint/v3/contenttype/forms">
-  <Display>DocumentLibraryForm</Display>
-  <Edit>DocumentLibraryForm</Edit>
-  <New>DocumentLibraryForm</New>
-</FormTemplates>
 </file>
 
 <file path=customXml/item3.xml><?xml version="1.0" encoding="utf-8"?>
@@ -9908,19 +10688,19 @@
 </file>
 
 <file path=customXml/itemProps1.xml><?xml version="1.0" encoding="utf-8"?>
+<ds:datastoreItem xmlns:ds="http://schemas.openxmlformats.org/officeDocument/2006/customXml" ds:itemID="{CDB58277-F8DF-46FF-84EC-EF41B835E69F}">
+  <ds:schemaRefs>
+    <ds:schemaRef ds:uri="http://schemas.microsoft.com/sharepoint/v3/contenttype/forms"/>
+  </ds:schemaRefs>
+</ds:datastoreItem>
+</file>
+
+<file path=customXml/itemProps2.xml><?xml version="1.0" encoding="utf-8"?>
 <ds:datastoreItem xmlns:ds="http://schemas.openxmlformats.org/officeDocument/2006/customXml" ds:itemID="{137651BA-F45C-4845-9AB3-E0A65B39F5E1}">
   <ds:schemaRefs>
     <ds:schemaRef ds:uri="71af3243-3dd4-4a8d-8c0d-dd76da1f02a5"/>
     <ds:schemaRef ds:uri="http://schemas.microsoft.com/office/2006/metadata/properties"/>
     <ds:schemaRef ds:uri="http://schemas.microsoft.com/office/infopath/2007/PartnerControls"/>
-  </ds:schemaRefs>
-</ds:datastoreItem>
-</file>
-
-<file path=customXml/itemProps2.xml><?xml version="1.0" encoding="utf-8"?>
-<ds:datastoreItem xmlns:ds="http://schemas.openxmlformats.org/officeDocument/2006/customXml" ds:itemID="{CDB58277-F8DF-46FF-84EC-EF41B835E69F}">
-  <ds:schemaRefs>
-    <ds:schemaRef ds:uri="http://schemas.microsoft.com/sharepoint/v3/contenttype/forms"/>
   </ds:schemaRefs>
 </ds:datastoreItem>
 </file>

</xml_diff>